<commit_message>
update design of database_structure
</commit_message>
<xml_diff>
--- a/database_structure.pptx
+++ b/database_structure.pptx
@@ -104,6 +104,11 @@
       </a:defRPr>
     </a:lvl9pPr>
   </p:defaultTextStyle>
+  <p:extLst>
+    <p:ext uri="{EFAFB233-063F-42B5-8137-9DF3F51BA10A}">
+      <p15:sldGuideLst xmlns:p15="http://schemas.microsoft.com/office/powerpoint/2012/main"/>
+    </p:ext>
+  </p:extLst>
 </p:presentation>
 </file>
 
@@ -4129,7 +4134,7 @@
         </p:nvGrpSpPr>
         <p:grpSpPr>
           <a:xfrm>
-            <a:off x="5698518" y="772203"/>
+            <a:off x="5386505" y="925162"/>
             <a:ext cx="1234533" cy="1471613"/>
             <a:chOff x="582884" y="628650"/>
             <a:chExt cx="1234533" cy="1471613"/>
@@ -5497,6 +5502,350 @@
                 <a:rPr lang="en-US" altLang="zh-CN" sz="800" dirty="0" smtClean="0"/>
                 <a:t>Data:</a:t>
               </a:r>
+            </a:p>
+            <a:p>
+              <a:endParaRPr lang="en-US" altLang="zh-CN" sz="800" dirty="0" smtClean="0"/>
+            </a:p>
+          </p:txBody>
+        </p:sp>
+      </p:grpSp>
+      <p:grpSp>
+        <p:nvGrpSpPr>
+          <p:cNvPr id="83" name="Group 82"/>
+          <p:cNvGrpSpPr/>
+          <p:nvPr/>
+        </p:nvGrpSpPr>
+        <p:grpSpPr>
+          <a:xfrm>
+            <a:off x="6866702" y="2445276"/>
+            <a:ext cx="962505" cy="1128014"/>
+            <a:chOff x="582884" y="628650"/>
+            <a:chExt cx="1234533" cy="1471613"/>
+          </a:xfrm>
+        </p:grpSpPr>
+        <p:sp>
+          <p:nvSpPr>
+            <p:cNvPr id="84" name="Rectangle 83"/>
+            <p:cNvSpPr/>
+            <p:nvPr/>
+          </p:nvSpPr>
+          <p:spPr>
+            <a:xfrm>
+              <a:off x="585788" y="628650"/>
+              <a:ext cx="1228725" cy="1471613"/>
+            </a:xfrm>
+            <a:prstGeom prst="rect">
+              <a:avLst/>
+            </a:prstGeom>
+            <a:noFill/>
+            <a:ln>
+              <a:solidFill>
+                <a:schemeClr val="accent2"/>
+              </a:solidFill>
+            </a:ln>
+          </p:spPr>
+          <p:style>
+            <a:lnRef idx="2">
+              <a:schemeClr val="accent1">
+                <a:shade val="50000"/>
+              </a:schemeClr>
+            </a:lnRef>
+            <a:fillRef idx="1">
+              <a:schemeClr val="accent1"/>
+            </a:fillRef>
+            <a:effectRef idx="0">
+              <a:schemeClr val="accent1"/>
+            </a:effectRef>
+            <a:fontRef idx="minor">
+              <a:schemeClr val="lt1"/>
+            </a:fontRef>
+          </p:style>
+          <p:txBody>
+            <a:bodyPr rtlCol="0" anchor="ctr"/>
+            <a:lstStyle/>
+            <a:p>
+              <a:pPr algn="ctr"/>
+              <a:endParaRPr lang="en-US"/>
+            </a:p>
+          </p:txBody>
+        </p:sp>
+        <p:cxnSp>
+          <p:nvCxnSpPr>
+            <p:cNvPr id="85" name="Straight Connector 84"/>
+            <p:cNvCxnSpPr/>
+            <p:nvPr/>
+          </p:nvCxnSpPr>
+          <p:spPr>
+            <a:xfrm>
+              <a:off x="588100" y="940959"/>
+              <a:ext cx="1229317" cy="3795"/>
+            </a:xfrm>
+            <a:prstGeom prst="line">
+              <a:avLst/>
+            </a:prstGeom>
+            <a:ln>
+              <a:solidFill>
+                <a:schemeClr val="accent2"/>
+              </a:solidFill>
+            </a:ln>
+          </p:spPr>
+          <p:style>
+            <a:lnRef idx="1">
+              <a:schemeClr val="accent1"/>
+            </a:lnRef>
+            <a:fillRef idx="0">
+              <a:schemeClr val="accent1"/>
+            </a:fillRef>
+            <a:effectRef idx="0">
+              <a:schemeClr val="accent1"/>
+            </a:effectRef>
+            <a:fontRef idx="minor">
+              <a:schemeClr val="tx1"/>
+            </a:fontRef>
+          </p:style>
+        </p:cxnSp>
+        <p:sp>
+          <p:nvSpPr>
+            <p:cNvPr id="86" name="TextBox 85"/>
+            <p:cNvSpPr txBox="1"/>
+            <p:nvPr/>
+          </p:nvSpPr>
+          <p:spPr>
+            <a:xfrm>
+              <a:off x="582884" y="628650"/>
+              <a:ext cx="1231629" cy="401527"/>
+            </a:xfrm>
+            <a:prstGeom prst="rect">
+              <a:avLst/>
+            </a:prstGeom>
+            <a:noFill/>
+          </p:spPr>
+          <p:txBody>
+            <a:bodyPr wrap="square" rtlCol="0">
+              <a:spAutoFit/>
+            </a:bodyPr>
+            <a:lstStyle/>
+            <a:p>
+              <a:r>
+                <a:rPr lang="en-US" altLang="zh-CN" sz="1400"/>
+                <a:t>D</a:t>
+              </a:r>
+              <a:r>
+                <a:rPr lang="en-US" altLang="zh-CN" sz="1400" smtClean="0"/>
+                <a:t>raft</a:t>
+              </a:r>
+              <a:endParaRPr lang="en-US" sz="1400" dirty="0"/>
+            </a:p>
+          </p:txBody>
+        </p:sp>
+        <p:sp>
+          <p:nvSpPr>
+            <p:cNvPr id="87" name="TextBox 86"/>
+            <p:cNvSpPr txBox="1"/>
+            <p:nvPr/>
+          </p:nvSpPr>
+          <p:spPr>
+            <a:xfrm>
+              <a:off x="614659" y="1001667"/>
+              <a:ext cx="1059648" cy="461665"/>
+            </a:xfrm>
+            <a:prstGeom prst="rect">
+              <a:avLst/>
+            </a:prstGeom>
+            <a:noFill/>
+          </p:spPr>
+          <p:txBody>
+            <a:bodyPr wrap="square" rtlCol="0">
+              <a:spAutoFit/>
+            </a:bodyPr>
+            <a:lstStyle/>
+            <a:p>
+              <a:r>
+                <a:rPr lang="en-US" altLang="zh-CN" sz="800" dirty="0" smtClean="0"/>
+                <a:t>ID:</a:t>
+              </a:r>
+            </a:p>
+            <a:p>
+              <a:r>
+                <a:rPr lang="en-US" altLang="zh-CN" sz="800" dirty="0" smtClean="0"/>
+                <a:t>type:</a:t>
+              </a:r>
+            </a:p>
+            <a:p>
+              <a:r>
+                <a:rPr lang="en-US" altLang="zh-CN" sz="800" dirty="0" smtClean="0"/>
+                <a:t>Data:</a:t>
+              </a:r>
+            </a:p>
+          </p:txBody>
+        </p:sp>
+      </p:grpSp>
+      <p:grpSp>
+        <p:nvGrpSpPr>
+          <p:cNvPr id="88" name="Group 87"/>
+          <p:cNvGrpSpPr/>
+          <p:nvPr/>
+        </p:nvGrpSpPr>
+        <p:grpSpPr>
+          <a:xfrm>
+            <a:off x="6311892" y="59194"/>
+            <a:ext cx="1109619" cy="850230"/>
+            <a:chOff x="582884" y="628650"/>
+            <a:chExt cx="1234533" cy="962538"/>
+          </a:xfrm>
+        </p:grpSpPr>
+        <p:sp>
+          <p:nvSpPr>
+            <p:cNvPr id="89" name="Rectangle 88"/>
+            <p:cNvSpPr/>
+            <p:nvPr/>
+          </p:nvSpPr>
+          <p:spPr>
+            <a:xfrm>
+              <a:off x="585788" y="628650"/>
+              <a:ext cx="1228725" cy="860073"/>
+            </a:xfrm>
+            <a:prstGeom prst="rect">
+              <a:avLst/>
+            </a:prstGeom>
+            <a:noFill/>
+            <a:ln>
+              <a:solidFill>
+                <a:schemeClr val="accent2"/>
+              </a:solidFill>
+            </a:ln>
+          </p:spPr>
+          <p:style>
+            <a:lnRef idx="2">
+              <a:schemeClr val="accent1">
+                <a:shade val="50000"/>
+              </a:schemeClr>
+            </a:lnRef>
+            <a:fillRef idx="1">
+              <a:schemeClr val="accent1"/>
+            </a:fillRef>
+            <a:effectRef idx="0">
+              <a:schemeClr val="accent1"/>
+            </a:effectRef>
+            <a:fontRef idx="minor">
+              <a:schemeClr val="lt1"/>
+            </a:fontRef>
+          </p:style>
+          <p:txBody>
+            <a:bodyPr rtlCol="0" anchor="ctr"/>
+            <a:lstStyle/>
+            <a:p>
+              <a:pPr algn="ctr"/>
+              <a:endParaRPr lang="en-US"/>
+            </a:p>
+          </p:txBody>
+        </p:sp>
+        <p:cxnSp>
+          <p:nvCxnSpPr>
+            <p:cNvPr id="90" name="Straight Connector 89"/>
+            <p:cNvCxnSpPr/>
+            <p:nvPr/>
+          </p:nvCxnSpPr>
+          <p:spPr>
+            <a:xfrm>
+              <a:off x="588100" y="940959"/>
+              <a:ext cx="1229317" cy="3795"/>
+            </a:xfrm>
+            <a:prstGeom prst="line">
+              <a:avLst/>
+            </a:prstGeom>
+            <a:ln>
+              <a:solidFill>
+                <a:schemeClr val="accent2"/>
+              </a:solidFill>
+            </a:ln>
+          </p:spPr>
+          <p:style>
+            <a:lnRef idx="1">
+              <a:schemeClr val="accent1"/>
+            </a:lnRef>
+            <a:fillRef idx="0">
+              <a:schemeClr val="accent1"/>
+            </a:fillRef>
+            <a:effectRef idx="0">
+              <a:schemeClr val="accent1"/>
+            </a:effectRef>
+            <a:fontRef idx="minor">
+              <a:schemeClr val="tx1"/>
+            </a:fontRef>
+          </p:style>
+        </p:cxnSp>
+        <p:sp>
+          <p:nvSpPr>
+            <p:cNvPr id="91" name="TextBox 90"/>
+            <p:cNvSpPr txBox="1"/>
+            <p:nvPr/>
+          </p:nvSpPr>
+          <p:spPr>
+            <a:xfrm>
+              <a:off x="582884" y="628650"/>
+              <a:ext cx="1231629" cy="393014"/>
+            </a:xfrm>
+            <a:prstGeom prst="rect">
+              <a:avLst/>
+            </a:prstGeom>
+            <a:noFill/>
+          </p:spPr>
+          <p:txBody>
+            <a:bodyPr wrap="square" rtlCol="0">
+              <a:spAutoFit/>
+            </a:bodyPr>
+            <a:lstStyle/>
+            <a:p>
+              <a:r>
+                <a:rPr lang="en-US" altLang="zh-CN" sz="1400" dirty="0" err="1" smtClean="0"/>
+                <a:t>Good_at</a:t>
+              </a:r>
+              <a:endParaRPr lang="en-US" sz="1400" dirty="0"/>
+            </a:p>
+          </p:txBody>
+        </p:sp>
+        <p:sp>
+          <p:nvSpPr>
+            <p:cNvPr id="92" name="TextBox 91"/>
+            <p:cNvSpPr txBox="1"/>
+            <p:nvPr/>
+          </p:nvSpPr>
+          <p:spPr>
+            <a:xfrm>
+              <a:off x="614659" y="1001667"/>
+              <a:ext cx="1119240" cy="589521"/>
+            </a:xfrm>
+            <a:prstGeom prst="rect">
+              <a:avLst/>
+            </a:prstGeom>
+            <a:noFill/>
+          </p:spPr>
+          <p:txBody>
+            <a:bodyPr wrap="square" rtlCol="0">
+              <a:spAutoFit/>
+            </a:bodyPr>
+            <a:lstStyle/>
+            <a:p>
+              <a:r>
+                <a:rPr lang="en-US" altLang="zh-CN" sz="800" dirty="0" smtClean="0"/>
+                <a:t>ID</a:t>
+              </a:r>
+              <a:r>
+                <a:rPr lang="en-US" altLang="zh-CN" sz="800" dirty="0" smtClean="0"/>
+                <a:t>:</a:t>
+              </a:r>
+            </a:p>
+            <a:p>
+              <a:r>
+                <a:rPr lang="en-US" altLang="zh-CN" sz="800" dirty="0" err="1" smtClean="0"/>
+                <a:t>User_id</a:t>
+              </a:r>
+              <a:r>
+                <a:rPr lang="en-US" altLang="zh-CN" sz="800" dirty="0" smtClean="0"/>
+                <a:t>:</a:t>
+              </a:r>
+              <a:endParaRPr lang="en-US" altLang="zh-CN" sz="800" dirty="0" smtClean="0"/>
             </a:p>
             <a:p>
               <a:endParaRPr lang="en-US" altLang="zh-CN" sz="800" dirty="0" smtClean="0"/>

</xml_diff>

<commit_message>
update possible database structure
</commit_message>
<xml_diff>
--- a/database_structure.pptx
+++ b/database_structure.pptx
@@ -243,7 +243,7 @@
           <a:p>
             <a:fld id="{4A455F30-BFD7-C44C-A532-EC0FD0695260}" type="datetimeFigureOut">
               <a:rPr lang="en-US" smtClean="0"/>
-              <a:t>5/12/16</a:t>
+              <a:t>5/16/16</a:t>
             </a:fld>
             <a:endParaRPr lang="en-US"/>
           </a:p>
@@ -413,7 +413,7 @@
           <a:p>
             <a:fld id="{4A455F30-BFD7-C44C-A532-EC0FD0695260}" type="datetimeFigureOut">
               <a:rPr lang="en-US" smtClean="0"/>
-              <a:t>5/12/16</a:t>
+              <a:t>5/16/16</a:t>
             </a:fld>
             <a:endParaRPr lang="en-US"/>
           </a:p>
@@ -593,7 +593,7 @@
           <a:p>
             <a:fld id="{4A455F30-BFD7-C44C-A532-EC0FD0695260}" type="datetimeFigureOut">
               <a:rPr lang="en-US" smtClean="0"/>
-              <a:t>5/12/16</a:t>
+              <a:t>5/16/16</a:t>
             </a:fld>
             <a:endParaRPr lang="en-US"/>
           </a:p>
@@ -763,7 +763,7 @@
           <a:p>
             <a:fld id="{4A455F30-BFD7-C44C-A532-EC0FD0695260}" type="datetimeFigureOut">
               <a:rPr lang="en-US" smtClean="0"/>
-              <a:t>5/12/16</a:t>
+              <a:t>5/16/16</a:t>
             </a:fld>
             <a:endParaRPr lang="en-US"/>
           </a:p>
@@ -1009,7 +1009,7 @@
           <a:p>
             <a:fld id="{4A455F30-BFD7-C44C-A532-EC0FD0695260}" type="datetimeFigureOut">
               <a:rPr lang="en-US" smtClean="0"/>
-              <a:t>5/12/16</a:t>
+              <a:t>5/16/16</a:t>
             </a:fld>
             <a:endParaRPr lang="en-US"/>
           </a:p>
@@ -1241,7 +1241,7 @@
           <a:p>
             <a:fld id="{4A455F30-BFD7-C44C-A532-EC0FD0695260}" type="datetimeFigureOut">
               <a:rPr lang="en-US" smtClean="0"/>
-              <a:t>5/12/16</a:t>
+              <a:t>5/16/16</a:t>
             </a:fld>
             <a:endParaRPr lang="en-US"/>
           </a:p>
@@ -1608,7 +1608,7 @@
           <a:p>
             <a:fld id="{4A455F30-BFD7-C44C-A532-EC0FD0695260}" type="datetimeFigureOut">
               <a:rPr lang="en-US" smtClean="0"/>
-              <a:t>5/12/16</a:t>
+              <a:t>5/16/16</a:t>
             </a:fld>
             <a:endParaRPr lang="en-US"/>
           </a:p>
@@ -1726,7 +1726,7 @@
           <a:p>
             <a:fld id="{4A455F30-BFD7-C44C-A532-EC0FD0695260}" type="datetimeFigureOut">
               <a:rPr lang="en-US" smtClean="0"/>
-              <a:t>5/12/16</a:t>
+              <a:t>5/16/16</a:t>
             </a:fld>
             <a:endParaRPr lang="en-US"/>
           </a:p>
@@ -1821,7 +1821,7 @@
           <a:p>
             <a:fld id="{4A455F30-BFD7-C44C-A532-EC0FD0695260}" type="datetimeFigureOut">
               <a:rPr lang="en-US" smtClean="0"/>
-              <a:t>5/12/16</a:t>
+              <a:t>5/16/16</a:t>
             </a:fld>
             <a:endParaRPr lang="en-US"/>
           </a:p>
@@ -2098,7 +2098,7 @@
           <a:p>
             <a:fld id="{4A455F30-BFD7-C44C-A532-EC0FD0695260}" type="datetimeFigureOut">
               <a:rPr lang="en-US" smtClean="0"/>
-              <a:t>5/12/16</a:t>
+              <a:t>5/16/16</a:t>
             </a:fld>
             <a:endParaRPr lang="en-US"/>
           </a:p>
@@ -2351,7 +2351,7 @@
           <a:p>
             <a:fld id="{4A455F30-BFD7-C44C-A532-EC0FD0695260}" type="datetimeFigureOut">
               <a:rPr lang="en-US" smtClean="0"/>
-              <a:t>5/12/16</a:t>
+              <a:t>5/16/16</a:t>
             </a:fld>
             <a:endParaRPr lang="en-US"/>
           </a:p>
@@ -2564,7 +2564,7 @@
           <a:p>
             <a:fld id="{4A455F30-BFD7-C44C-A532-EC0FD0695260}" type="datetimeFigureOut">
               <a:rPr lang="en-US" smtClean="0"/>
-              <a:t>5/12/16</a:t>
+              <a:t>5/16/16</a:t>
             </a:fld>
             <a:endParaRPr lang="en-US"/>
           </a:p>
@@ -4516,7 +4516,7 @@
         </p:nvGrpSpPr>
         <p:grpSpPr>
           <a:xfrm>
-            <a:off x="678256" y="4927542"/>
+            <a:off x="1360734" y="4992793"/>
             <a:ext cx="1234533" cy="1471613"/>
             <a:chOff x="582884" y="628650"/>
             <a:chExt cx="1234533" cy="1471613"/>
@@ -5829,11 +5829,7 @@
             <a:p>
               <a:r>
                 <a:rPr lang="en-US" altLang="zh-CN" sz="800" dirty="0" smtClean="0"/>
-                <a:t>ID</a:t>
-              </a:r>
-              <a:r>
-                <a:rPr lang="en-US" altLang="zh-CN" sz="800" dirty="0" smtClean="0"/>
-                <a:t>:</a:t>
+                <a:t>ID:</a:t>
               </a:r>
             </a:p>
             <a:p>
@@ -5845,9 +5841,190 @@
                 <a:rPr lang="en-US" altLang="zh-CN" sz="800" dirty="0" smtClean="0"/>
                 <a:t>:</a:t>
               </a:r>
+            </a:p>
+            <a:p>
               <a:endParaRPr lang="en-US" altLang="zh-CN" sz="800" dirty="0" smtClean="0"/>
             </a:p>
-            <a:p>
+          </p:txBody>
+        </p:sp>
+      </p:grpSp>
+      <p:grpSp>
+        <p:nvGrpSpPr>
+          <p:cNvPr id="93" name="Group 92"/>
+          <p:cNvGrpSpPr/>
+          <p:nvPr/>
+        </p:nvGrpSpPr>
+        <p:grpSpPr>
+          <a:xfrm>
+            <a:off x="28046" y="5001640"/>
+            <a:ext cx="1234533" cy="1471613"/>
+            <a:chOff x="582884" y="628650"/>
+            <a:chExt cx="1234533" cy="1471613"/>
+          </a:xfrm>
+        </p:grpSpPr>
+        <p:sp>
+          <p:nvSpPr>
+            <p:cNvPr id="94" name="Rectangle 93"/>
+            <p:cNvSpPr/>
+            <p:nvPr/>
+          </p:nvSpPr>
+          <p:spPr>
+            <a:xfrm>
+              <a:off x="585788" y="628650"/>
+              <a:ext cx="1228725" cy="1471613"/>
+            </a:xfrm>
+            <a:prstGeom prst="rect">
+              <a:avLst/>
+            </a:prstGeom>
+            <a:noFill/>
+            <a:ln>
+              <a:solidFill>
+                <a:schemeClr val="accent2"/>
+              </a:solidFill>
+            </a:ln>
+          </p:spPr>
+          <p:style>
+            <a:lnRef idx="2">
+              <a:schemeClr val="accent1">
+                <a:shade val="50000"/>
+              </a:schemeClr>
+            </a:lnRef>
+            <a:fillRef idx="1">
+              <a:schemeClr val="accent1"/>
+            </a:fillRef>
+            <a:effectRef idx="0">
+              <a:schemeClr val="accent1"/>
+            </a:effectRef>
+            <a:fontRef idx="minor">
+              <a:schemeClr val="lt1"/>
+            </a:fontRef>
+          </p:style>
+          <p:txBody>
+            <a:bodyPr rtlCol="0" anchor="ctr"/>
+            <a:lstStyle/>
+            <a:p>
+              <a:pPr algn="ctr"/>
+              <a:endParaRPr lang="en-US"/>
+            </a:p>
+          </p:txBody>
+        </p:sp>
+        <p:cxnSp>
+          <p:nvCxnSpPr>
+            <p:cNvPr id="95" name="Straight Connector 94"/>
+            <p:cNvCxnSpPr/>
+            <p:nvPr/>
+          </p:nvCxnSpPr>
+          <p:spPr>
+            <a:xfrm>
+              <a:off x="588100" y="940959"/>
+              <a:ext cx="1229317" cy="3795"/>
+            </a:xfrm>
+            <a:prstGeom prst="line">
+              <a:avLst/>
+            </a:prstGeom>
+            <a:ln>
+              <a:solidFill>
+                <a:schemeClr val="accent2"/>
+              </a:solidFill>
+            </a:ln>
+          </p:spPr>
+          <p:style>
+            <a:lnRef idx="1">
+              <a:schemeClr val="accent1"/>
+            </a:lnRef>
+            <a:fillRef idx="0">
+              <a:schemeClr val="accent1"/>
+            </a:fillRef>
+            <a:effectRef idx="0">
+              <a:schemeClr val="accent1"/>
+            </a:effectRef>
+            <a:fontRef idx="minor">
+              <a:schemeClr val="tx1"/>
+            </a:fontRef>
+          </p:style>
+        </p:cxnSp>
+        <p:sp>
+          <p:nvSpPr>
+            <p:cNvPr id="96" name="TextBox 95"/>
+            <p:cNvSpPr txBox="1"/>
+            <p:nvPr/>
+          </p:nvSpPr>
+          <p:spPr>
+            <a:xfrm>
+              <a:off x="582884" y="628650"/>
+              <a:ext cx="1231629" cy="307777"/>
+            </a:xfrm>
+            <a:prstGeom prst="rect">
+              <a:avLst/>
+            </a:prstGeom>
+            <a:noFill/>
+          </p:spPr>
+          <p:txBody>
+            <a:bodyPr wrap="square" rtlCol="0">
+              <a:spAutoFit/>
+            </a:bodyPr>
+            <a:lstStyle/>
+            <a:p>
+              <a:r>
+                <a:rPr lang="en-US" altLang="zh-CN" sz="1400" dirty="0" smtClean="0"/>
+                <a:t>conversation</a:t>
+              </a:r>
+              <a:endParaRPr lang="en-US" sz="1400" dirty="0"/>
+            </a:p>
+          </p:txBody>
+        </p:sp>
+        <p:sp>
+          <p:nvSpPr>
+            <p:cNvPr id="97" name="TextBox 96"/>
+            <p:cNvSpPr txBox="1"/>
+            <p:nvPr/>
+          </p:nvSpPr>
+          <p:spPr>
+            <a:xfrm>
+              <a:off x="614659" y="1001667"/>
+              <a:ext cx="662361" cy="584775"/>
+            </a:xfrm>
+            <a:prstGeom prst="rect">
+              <a:avLst/>
+            </a:prstGeom>
+            <a:noFill/>
+          </p:spPr>
+          <p:txBody>
+            <a:bodyPr wrap="none" rtlCol="0">
+              <a:spAutoFit/>
+            </a:bodyPr>
+            <a:lstStyle/>
+            <a:p>
+              <a:r>
+                <a:rPr lang="en-US" altLang="zh-CN" sz="800" dirty="0" smtClean="0"/>
+                <a:t>ID:</a:t>
+              </a:r>
+            </a:p>
+            <a:p>
+              <a:r>
+                <a:rPr lang="en-US" altLang="zh-CN" sz="800" dirty="0" smtClean="0"/>
+                <a:t>data:</a:t>
+              </a:r>
+            </a:p>
+            <a:p>
+              <a:r>
+                <a:rPr lang="en-US" altLang="zh-CN" sz="800" dirty="0" err="1" smtClean="0"/>
+                <a:t>From_user</a:t>
+              </a:r>
+              <a:r>
+                <a:rPr lang="en-US" altLang="zh-CN" sz="800" dirty="0" smtClean="0"/>
+                <a:t>:</a:t>
+              </a:r>
+            </a:p>
+            <a:p>
+              <a:r>
+                <a:rPr lang="en-US" altLang="zh-CN" sz="800" dirty="0" err="1" smtClean="0"/>
+                <a:t>To_user</a:t>
+              </a:r>
+              <a:r>
+                <a:rPr lang="en-US" altLang="zh-CN" sz="800" smtClean="0"/>
+                <a:t>:</a:t>
+              </a:r>
               <a:endParaRPr lang="en-US" altLang="zh-CN" sz="800" dirty="0" smtClean="0"/>
             </a:p>
           </p:txBody>

</xml_diff>

<commit_message>
partial message function implemented
1. can send message to user
</commit_message>
<xml_diff>
--- a/database_structure.pptx
+++ b/database_structure.pptx
@@ -243,7 +243,7 @@
           <a:p>
             <a:fld id="{4A455F30-BFD7-C44C-A532-EC0FD0695260}" type="datetimeFigureOut">
               <a:rPr lang="en-US" smtClean="0"/>
-              <a:t>5/16/16</a:t>
+              <a:t>5/24/16</a:t>
             </a:fld>
             <a:endParaRPr lang="en-US"/>
           </a:p>
@@ -413,7 +413,7 @@
           <a:p>
             <a:fld id="{4A455F30-BFD7-C44C-A532-EC0FD0695260}" type="datetimeFigureOut">
               <a:rPr lang="en-US" smtClean="0"/>
-              <a:t>5/16/16</a:t>
+              <a:t>5/24/16</a:t>
             </a:fld>
             <a:endParaRPr lang="en-US"/>
           </a:p>
@@ -593,7 +593,7 @@
           <a:p>
             <a:fld id="{4A455F30-BFD7-C44C-A532-EC0FD0695260}" type="datetimeFigureOut">
               <a:rPr lang="en-US" smtClean="0"/>
-              <a:t>5/16/16</a:t>
+              <a:t>5/24/16</a:t>
             </a:fld>
             <a:endParaRPr lang="en-US"/>
           </a:p>
@@ -763,7 +763,7 @@
           <a:p>
             <a:fld id="{4A455F30-BFD7-C44C-A532-EC0FD0695260}" type="datetimeFigureOut">
               <a:rPr lang="en-US" smtClean="0"/>
-              <a:t>5/16/16</a:t>
+              <a:t>5/24/16</a:t>
             </a:fld>
             <a:endParaRPr lang="en-US"/>
           </a:p>
@@ -1009,7 +1009,7 @@
           <a:p>
             <a:fld id="{4A455F30-BFD7-C44C-A532-EC0FD0695260}" type="datetimeFigureOut">
               <a:rPr lang="en-US" smtClean="0"/>
-              <a:t>5/16/16</a:t>
+              <a:t>5/24/16</a:t>
             </a:fld>
             <a:endParaRPr lang="en-US"/>
           </a:p>
@@ -1241,7 +1241,7 @@
           <a:p>
             <a:fld id="{4A455F30-BFD7-C44C-A532-EC0FD0695260}" type="datetimeFigureOut">
               <a:rPr lang="en-US" smtClean="0"/>
-              <a:t>5/16/16</a:t>
+              <a:t>5/24/16</a:t>
             </a:fld>
             <a:endParaRPr lang="en-US"/>
           </a:p>
@@ -1608,7 +1608,7 @@
           <a:p>
             <a:fld id="{4A455F30-BFD7-C44C-A532-EC0FD0695260}" type="datetimeFigureOut">
               <a:rPr lang="en-US" smtClean="0"/>
-              <a:t>5/16/16</a:t>
+              <a:t>5/24/16</a:t>
             </a:fld>
             <a:endParaRPr lang="en-US"/>
           </a:p>
@@ -1726,7 +1726,7 @@
           <a:p>
             <a:fld id="{4A455F30-BFD7-C44C-A532-EC0FD0695260}" type="datetimeFigureOut">
               <a:rPr lang="en-US" smtClean="0"/>
-              <a:t>5/16/16</a:t>
+              <a:t>5/24/16</a:t>
             </a:fld>
             <a:endParaRPr lang="en-US"/>
           </a:p>
@@ -1821,7 +1821,7 @@
           <a:p>
             <a:fld id="{4A455F30-BFD7-C44C-A532-EC0FD0695260}" type="datetimeFigureOut">
               <a:rPr lang="en-US" smtClean="0"/>
-              <a:t>5/16/16</a:t>
+              <a:t>5/24/16</a:t>
             </a:fld>
             <a:endParaRPr lang="en-US"/>
           </a:p>
@@ -2098,7 +2098,7 @@
           <a:p>
             <a:fld id="{4A455F30-BFD7-C44C-A532-EC0FD0695260}" type="datetimeFigureOut">
               <a:rPr lang="en-US" smtClean="0"/>
-              <a:t>5/16/16</a:t>
+              <a:t>5/24/16</a:t>
             </a:fld>
             <a:endParaRPr lang="en-US"/>
           </a:p>
@@ -2351,7 +2351,7 @@
           <a:p>
             <a:fld id="{4A455F30-BFD7-C44C-A532-EC0FD0695260}" type="datetimeFigureOut">
               <a:rPr lang="en-US" smtClean="0"/>
-              <a:t>5/16/16</a:t>
+              <a:t>5/24/16</a:t>
             </a:fld>
             <a:endParaRPr lang="en-US"/>
           </a:p>
@@ -2564,7 +2564,7 @@
           <a:p>
             <a:fld id="{4A455F30-BFD7-C44C-A532-EC0FD0695260}" type="datetimeFigureOut">
               <a:rPr lang="en-US" smtClean="0"/>
-              <a:t>5/16/16</a:t>
+              <a:t>5/24/16</a:t>
             </a:fld>
             <a:endParaRPr lang="en-US"/>
           </a:p>
@@ -4642,7 +4642,7 @@
           <p:spPr>
             <a:xfrm>
               <a:off x="614659" y="1001667"/>
-              <a:ext cx="662361" cy="707886"/>
+              <a:ext cx="510076" cy="338554"/>
             </a:xfrm>
             <a:prstGeom prst="rect">
               <a:avLst/>
@@ -4663,38 +4663,9 @@
             <a:p>
               <a:r>
                 <a:rPr lang="en-US" altLang="zh-CN" sz="800" dirty="0" smtClean="0"/>
-                <a:t>data:</a:t>
-              </a:r>
-            </a:p>
-            <a:p>
-              <a:r>
-                <a:rPr lang="en-US" altLang="zh-CN" sz="800" dirty="0" err="1" smtClean="0"/>
-                <a:t>From_user</a:t>
-              </a:r>
-              <a:r>
-                <a:rPr lang="en-US" altLang="zh-CN" sz="800" dirty="0" smtClean="0"/>
-                <a:t>:</a:t>
-              </a:r>
-            </a:p>
-            <a:p>
-              <a:r>
-                <a:rPr lang="en-US" altLang="zh-CN" sz="800" dirty="0" err="1" smtClean="0"/>
-                <a:t>To_user</a:t>
-              </a:r>
-              <a:r>
-                <a:rPr lang="en-US" altLang="zh-CN" sz="800" dirty="0" smtClean="0"/>
-                <a:t>:</a:t>
-              </a:r>
-            </a:p>
-            <a:p>
-              <a:r>
-                <a:rPr lang="en-US" altLang="zh-CN" sz="800" dirty="0" err="1" smtClean="0"/>
-                <a:t>hasRead</a:t>
-              </a:r>
-              <a:r>
-                <a:rPr lang="en-US" altLang="zh-CN" sz="800" dirty="0" smtClean="0"/>
-                <a:t>:</a:t>
-              </a:r>
+                <a:t>content</a:t>
+              </a:r>
+              <a:endParaRPr lang="en-US" altLang="zh-CN" sz="800" dirty="0" smtClean="0"/>
             </a:p>
           </p:txBody>
         </p:sp>
@@ -5982,7 +5953,7 @@
           <p:spPr>
             <a:xfrm>
               <a:off x="614659" y="1001667"/>
-              <a:ext cx="662361" cy="584775"/>
+              <a:ext cx="606256" cy="338554"/>
             </a:xfrm>
             <a:prstGeom prst="rect">
               <a:avLst/>
@@ -6002,30 +5973,394 @@
             </a:p>
             <a:p>
               <a:r>
-                <a:rPr lang="en-US" altLang="zh-CN" sz="800" dirty="0" smtClean="0"/>
-                <a:t>data:</a:t>
-              </a:r>
-            </a:p>
-            <a:p>
-              <a:r>
                 <a:rPr lang="en-US" altLang="zh-CN" sz="800" dirty="0" err="1" smtClean="0"/>
-                <a:t>From_user</a:t>
-              </a:r>
-              <a:r>
-                <a:rPr lang="en-US" altLang="zh-CN" sz="800" dirty="0" smtClean="0"/>
-                <a:t>:</a:t>
-              </a:r>
-            </a:p>
-            <a:p>
-              <a:r>
-                <a:rPr lang="en-US" altLang="zh-CN" sz="800" dirty="0" err="1" smtClean="0"/>
-                <a:t>To_user</a:t>
-              </a:r>
-              <a:r>
-                <a:rPr lang="en-US" altLang="zh-CN" sz="800" smtClean="0"/>
-                <a:t>:</a:t>
+                <a:t>Can_reply</a:t>
               </a:r>
               <a:endParaRPr lang="en-US" altLang="zh-CN" sz="800" dirty="0" smtClean="0"/>
+            </a:p>
+          </p:txBody>
+        </p:sp>
+      </p:grpSp>
+      <p:grpSp>
+        <p:nvGrpSpPr>
+          <p:cNvPr id="38" name="Group 37"/>
+          <p:cNvGrpSpPr/>
+          <p:nvPr/>
+        </p:nvGrpSpPr>
+        <p:grpSpPr>
+          <a:xfrm>
+            <a:off x="-599228" y="1364457"/>
+            <a:ext cx="1185016" cy="4372990"/>
+            <a:chOff x="-599228" y="1364457"/>
+            <a:chExt cx="1185016" cy="4372990"/>
+          </a:xfrm>
+        </p:grpSpPr>
+        <p:cxnSp>
+          <p:nvCxnSpPr>
+            <p:cNvPr id="7" name="Curved Connector 6"/>
+            <p:cNvCxnSpPr>
+              <a:stCxn id="4" idx="1"/>
+              <a:endCxn id="94" idx="1"/>
+            </p:cNvCxnSpPr>
+            <p:nvPr/>
+          </p:nvCxnSpPr>
+          <p:spPr>
+            <a:xfrm rot="10800000" flipV="1">
+              <a:off x="30950" y="1364457"/>
+              <a:ext cx="554838" cy="4372990"/>
+            </a:xfrm>
+            <a:prstGeom prst="curvedConnector3">
+              <a:avLst>
+                <a:gd name="adj1" fmla="val 141201"/>
+              </a:avLst>
+            </a:prstGeom>
+            <a:ln>
+              <a:headEnd type="triangle"/>
+              <a:tailEnd type="triangle"/>
+            </a:ln>
+          </p:spPr>
+          <p:style>
+            <a:lnRef idx="1">
+              <a:schemeClr val="accent1"/>
+            </a:lnRef>
+            <a:fillRef idx="0">
+              <a:schemeClr val="accent1"/>
+            </a:fillRef>
+            <a:effectRef idx="0">
+              <a:schemeClr val="accent1"/>
+            </a:effectRef>
+            <a:fontRef idx="minor">
+              <a:schemeClr val="tx1"/>
+            </a:fontRef>
+          </p:style>
+        </p:cxnSp>
+        <p:sp>
+          <p:nvSpPr>
+            <p:cNvPr id="37" name="TextBox 36"/>
+            <p:cNvSpPr txBox="1"/>
+            <p:nvPr/>
+          </p:nvSpPr>
+          <p:spPr>
+            <a:xfrm>
+              <a:off x="-599228" y="3241278"/>
+              <a:ext cx="1036502" cy="646331"/>
+            </a:xfrm>
+            <a:prstGeom prst="rect">
+              <a:avLst/>
+            </a:prstGeom>
+            <a:noFill/>
+          </p:spPr>
+          <p:txBody>
+            <a:bodyPr wrap="none" rtlCol="0">
+              <a:spAutoFit/>
+            </a:bodyPr>
+            <a:lstStyle/>
+            <a:p>
+              <a:r>
+                <a:rPr lang="en-US" altLang="zh-CN" smtClean="0"/>
+                <a:t>hasMany</a:t>
+              </a:r>
+              <a:endParaRPr lang="en-US" altLang="zh-CN" dirty="0" smtClean="0"/>
+            </a:p>
+            <a:p>
+              <a:r>
+                <a:rPr lang="en-US" altLang="zh-CN" dirty="0" err="1" smtClean="0"/>
+                <a:t>hasMany</a:t>
+              </a:r>
+              <a:endParaRPr lang="en-US" dirty="0"/>
+            </a:p>
+          </p:txBody>
+        </p:sp>
+      </p:grpSp>
+      <p:grpSp>
+        <p:nvGrpSpPr>
+          <p:cNvPr id="98" name="Group 97"/>
+          <p:cNvGrpSpPr/>
+          <p:nvPr/>
+        </p:nvGrpSpPr>
+        <p:grpSpPr>
+          <a:xfrm>
+            <a:off x="645313" y="6464406"/>
+            <a:ext cx="1332688" cy="683695"/>
+            <a:chOff x="-2423880" y="1052148"/>
+            <a:chExt cx="1332688" cy="683695"/>
+          </a:xfrm>
+        </p:grpSpPr>
+        <p:cxnSp>
+          <p:nvCxnSpPr>
+            <p:cNvPr id="99" name="Curved Connector 98"/>
+            <p:cNvCxnSpPr>
+              <a:stCxn id="94" idx="2"/>
+              <a:endCxn id="52" idx="2"/>
+            </p:cNvCxnSpPr>
+            <p:nvPr/>
+          </p:nvCxnSpPr>
+          <p:spPr>
+            <a:xfrm rot="5400000" flipH="1" flipV="1">
+              <a:off x="-1761960" y="390228"/>
+              <a:ext cx="8847" cy="1332688"/>
+            </a:xfrm>
+            <a:prstGeom prst="curvedConnector3">
+              <a:avLst>
+                <a:gd name="adj1" fmla="val -2583927"/>
+              </a:avLst>
+            </a:prstGeom>
+            <a:ln>
+              <a:headEnd type="triangle"/>
+              <a:tailEnd type="triangle"/>
+            </a:ln>
+          </p:spPr>
+          <p:style>
+            <a:lnRef idx="1">
+              <a:schemeClr val="accent1"/>
+            </a:lnRef>
+            <a:fillRef idx="0">
+              <a:schemeClr val="accent1"/>
+            </a:fillRef>
+            <a:effectRef idx="0">
+              <a:schemeClr val="accent1"/>
+            </a:effectRef>
+            <a:fontRef idx="minor">
+              <a:schemeClr val="tx1"/>
+            </a:fontRef>
+          </p:style>
+        </p:cxnSp>
+        <p:sp>
+          <p:nvSpPr>
+            <p:cNvPr id="100" name="TextBox 99"/>
+            <p:cNvSpPr txBox="1"/>
+            <p:nvPr/>
+          </p:nvSpPr>
+          <p:spPr>
+            <a:xfrm>
+              <a:off x="-2203110" y="1089512"/>
+              <a:ext cx="1036502" cy="646331"/>
+            </a:xfrm>
+            <a:prstGeom prst="rect">
+              <a:avLst/>
+            </a:prstGeom>
+            <a:noFill/>
+          </p:spPr>
+          <p:txBody>
+            <a:bodyPr wrap="none" rtlCol="0">
+              <a:spAutoFit/>
+            </a:bodyPr>
+            <a:lstStyle/>
+            <a:p>
+              <a:r>
+                <a:rPr lang="en-US" altLang="zh-CN" dirty="0" err="1" smtClean="0"/>
+                <a:t>hasMany</a:t>
+              </a:r>
+              <a:endParaRPr lang="en-US" altLang="zh-CN" dirty="0" smtClean="0"/>
+            </a:p>
+            <a:p>
+              <a:r>
+                <a:rPr lang="en-US" altLang="zh-CN" dirty="0" err="1" smtClean="0"/>
+                <a:t>belongTo</a:t>
+              </a:r>
+              <a:endParaRPr lang="en-US" dirty="0"/>
+            </a:p>
+          </p:txBody>
+        </p:sp>
+      </p:grpSp>
+      <p:grpSp>
+        <p:nvGrpSpPr>
+          <p:cNvPr id="101" name="Group 100"/>
+          <p:cNvGrpSpPr/>
+          <p:nvPr/>
+        </p:nvGrpSpPr>
+        <p:grpSpPr>
+          <a:xfrm>
+            <a:off x="1464464" y="1364457"/>
+            <a:ext cx="1041182" cy="3628336"/>
+            <a:chOff x="-1956338" y="913511"/>
+            <a:chExt cx="1041182" cy="3628336"/>
+          </a:xfrm>
+        </p:grpSpPr>
+        <p:cxnSp>
+          <p:nvCxnSpPr>
+            <p:cNvPr id="102" name="Curved Connector 101"/>
+            <p:cNvCxnSpPr>
+              <a:stCxn id="4" idx="3"/>
+              <a:endCxn id="52" idx="0"/>
+            </p:cNvCxnSpPr>
+            <p:nvPr/>
+          </p:nvCxnSpPr>
+          <p:spPr>
+            <a:xfrm>
+              <a:off x="-1606289" y="913511"/>
+              <a:ext cx="163488" cy="3628336"/>
+            </a:xfrm>
+            <a:prstGeom prst="curvedConnector2">
+              <a:avLst/>
+            </a:prstGeom>
+            <a:ln>
+              <a:headEnd type="triangle"/>
+              <a:tailEnd type="triangle"/>
+            </a:ln>
+          </p:spPr>
+          <p:style>
+            <a:lnRef idx="1">
+              <a:schemeClr val="accent1"/>
+            </a:lnRef>
+            <a:fillRef idx="0">
+              <a:schemeClr val="accent1"/>
+            </a:fillRef>
+            <a:effectRef idx="0">
+              <a:schemeClr val="accent1"/>
+            </a:effectRef>
+            <a:fontRef idx="minor">
+              <a:schemeClr val="tx1"/>
+            </a:fontRef>
+          </p:style>
+        </p:cxnSp>
+        <p:sp>
+          <p:nvSpPr>
+            <p:cNvPr id="103" name="TextBox 102"/>
+            <p:cNvSpPr txBox="1"/>
+            <p:nvPr/>
+          </p:nvSpPr>
+          <p:spPr>
+            <a:xfrm>
+              <a:off x="-1956338" y="1861300"/>
+              <a:ext cx="1041182" cy="923330"/>
+            </a:xfrm>
+            <a:prstGeom prst="rect">
+              <a:avLst/>
+            </a:prstGeom>
+            <a:noFill/>
+          </p:spPr>
+          <p:txBody>
+            <a:bodyPr wrap="none" rtlCol="0">
+              <a:spAutoFit/>
+            </a:bodyPr>
+            <a:lstStyle/>
+            <a:p>
+              <a:r>
+                <a:rPr lang="en-US" altLang="zh-CN" dirty="0" err="1" smtClean="0"/>
+                <a:t>hasMany</a:t>
+              </a:r>
+              <a:endParaRPr lang="en-US" altLang="zh-CN" dirty="0" smtClean="0"/>
+            </a:p>
+            <a:p>
+              <a:r>
+                <a:rPr lang="en-US" altLang="zh-CN" dirty="0" err="1" smtClean="0"/>
+                <a:t>hasMany</a:t>
+              </a:r>
+              <a:endParaRPr lang="en-US" altLang="zh-CN" dirty="0" smtClean="0"/>
+            </a:p>
+            <a:p>
+              <a:r>
+                <a:rPr lang="en-US" altLang="zh-CN" dirty="0" smtClean="0"/>
+                <a:t>(unread)</a:t>
+              </a:r>
+              <a:endParaRPr lang="en-US" dirty="0"/>
+            </a:p>
+          </p:txBody>
+        </p:sp>
+      </p:grpSp>
+      <p:grpSp>
+        <p:nvGrpSpPr>
+          <p:cNvPr id="106" name="Group 105"/>
+          <p:cNvGrpSpPr/>
+          <p:nvPr/>
+        </p:nvGrpSpPr>
+        <p:grpSpPr>
+          <a:xfrm>
+            <a:off x="1814513" y="1364457"/>
+            <a:ext cx="1489675" cy="4364143"/>
+            <a:chOff x="-2351808" y="1020905"/>
+            <a:chExt cx="1489675" cy="4364143"/>
+          </a:xfrm>
+        </p:grpSpPr>
+        <p:cxnSp>
+          <p:nvCxnSpPr>
+            <p:cNvPr id="107" name="Curved Connector 106"/>
+            <p:cNvCxnSpPr>
+              <a:stCxn id="4" idx="3"/>
+              <a:endCxn id="52" idx="3"/>
+            </p:cNvCxnSpPr>
+            <p:nvPr/>
+          </p:nvCxnSpPr>
+          <p:spPr>
+            <a:xfrm>
+              <a:off x="-2351808" y="1020905"/>
+              <a:ext cx="777850" cy="4364143"/>
+            </a:xfrm>
+            <a:prstGeom prst="curvedConnector3">
+              <a:avLst>
+                <a:gd name="adj1" fmla="val 129389"/>
+              </a:avLst>
+            </a:prstGeom>
+            <a:ln>
+              <a:headEnd type="triangle"/>
+              <a:tailEnd type="triangle"/>
+            </a:ln>
+          </p:spPr>
+          <p:style>
+            <a:lnRef idx="1">
+              <a:schemeClr val="accent1"/>
+            </a:lnRef>
+            <a:fillRef idx="0">
+              <a:schemeClr val="accent1"/>
+            </a:fillRef>
+            <a:effectRef idx="0">
+              <a:schemeClr val="accent1"/>
+            </a:effectRef>
+            <a:fontRef idx="minor">
+              <a:schemeClr val="tx1"/>
+            </a:fontRef>
+          </p:style>
+        </p:cxnSp>
+        <p:sp>
+          <p:nvSpPr>
+            <p:cNvPr id="108" name="TextBox 107"/>
+            <p:cNvSpPr txBox="1"/>
+            <p:nvPr/>
+          </p:nvSpPr>
+          <p:spPr>
+            <a:xfrm>
+              <a:off x="-1903315" y="3697455"/>
+              <a:ext cx="1041182" cy="923330"/>
+            </a:xfrm>
+            <a:prstGeom prst="rect">
+              <a:avLst/>
+            </a:prstGeom>
+            <a:noFill/>
+          </p:spPr>
+          <p:txBody>
+            <a:bodyPr wrap="none" rtlCol="0">
+              <a:spAutoFit/>
+            </a:bodyPr>
+            <a:lstStyle/>
+            <a:p>
+              <a:r>
+                <a:rPr lang="en-US" altLang="zh-CN" dirty="0" err="1" smtClean="0"/>
+                <a:t>hasMany</a:t>
+              </a:r>
+              <a:endParaRPr lang="en-US" altLang="zh-CN" dirty="0" smtClean="0"/>
+            </a:p>
+            <a:p>
+              <a:r>
+                <a:rPr lang="en-US" altLang="zh-CN" dirty="0" err="1" smtClean="0"/>
+                <a:t>belongTo</a:t>
+              </a:r>
+              <a:endParaRPr lang="en-US" altLang="zh-CN" dirty="0" smtClean="0"/>
+            </a:p>
+            <a:p>
+              <a:r>
+                <a:rPr lang="en-US" altLang="zh-CN" dirty="0" smtClean="0"/>
+                <a:t>(</a:t>
+              </a:r>
+              <a:r>
+                <a:rPr lang="en-US" altLang="zh-CN" dirty="0" err="1" smtClean="0"/>
+                <a:t>sentBy</a:t>
+              </a:r>
+              <a:r>
+                <a:rPr lang="en-US" altLang="zh-CN" dirty="0" smtClean="0"/>
+                <a:t>)</a:t>
+              </a:r>
+              <a:endParaRPr lang="en-US" dirty="0"/>
             </a:p>
           </p:txBody>
         </p:sp>

</xml_diff>

<commit_message>
partial controller and view of user(homepage) implemented
</commit_message>
<xml_diff>
--- a/database_structure.pptx
+++ b/database_structure.pptx
@@ -243,7 +243,7 @@
           <a:p>
             <a:fld id="{4A455F30-BFD7-C44C-A532-EC0FD0695260}" type="datetimeFigureOut">
               <a:rPr lang="en-US" smtClean="0"/>
-              <a:t>5/24/16</a:t>
+              <a:t>5/26/16</a:t>
             </a:fld>
             <a:endParaRPr lang="en-US"/>
           </a:p>
@@ -413,7 +413,7 @@
           <a:p>
             <a:fld id="{4A455F30-BFD7-C44C-A532-EC0FD0695260}" type="datetimeFigureOut">
               <a:rPr lang="en-US" smtClean="0"/>
-              <a:t>5/24/16</a:t>
+              <a:t>5/26/16</a:t>
             </a:fld>
             <a:endParaRPr lang="en-US"/>
           </a:p>
@@ -593,7 +593,7 @@
           <a:p>
             <a:fld id="{4A455F30-BFD7-C44C-A532-EC0FD0695260}" type="datetimeFigureOut">
               <a:rPr lang="en-US" smtClean="0"/>
-              <a:t>5/24/16</a:t>
+              <a:t>5/26/16</a:t>
             </a:fld>
             <a:endParaRPr lang="en-US"/>
           </a:p>
@@ -763,7 +763,7 @@
           <a:p>
             <a:fld id="{4A455F30-BFD7-C44C-A532-EC0FD0695260}" type="datetimeFigureOut">
               <a:rPr lang="en-US" smtClean="0"/>
-              <a:t>5/24/16</a:t>
+              <a:t>5/26/16</a:t>
             </a:fld>
             <a:endParaRPr lang="en-US"/>
           </a:p>
@@ -1009,7 +1009,7 @@
           <a:p>
             <a:fld id="{4A455F30-BFD7-C44C-A532-EC0FD0695260}" type="datetimeFigureOut">
               <a:rPr lang="en-US" smtClean="0"/>
-              <a:t>5/24/16</a:t>
+              <a:t>5/26/16</a:t>
             </a:fld>
             <a:endParaRPr lang="en-US"/>
           </a:p>
@@ -1241,7 +1241,7 @@
           <a:p>
             <a:fld id="{4A455F30-BFD7-C44C-A532-EC0FD0695260}" type="datetimeFigureOut">
               <a:rPr lang="en-US" smtClean="0"/>
-              <a:t>5/24/16</a:t>
+              <a:t>5/26/16</a:t>
             </a:fld>
             <a:endParaRPr lang="en-US"/>
           </a:p>
@@ -1608,7 +1608,7 @@
           <a:p>
             <a:fld id="{4A455F30-BFD7-C44C-A532-EC0FD0695260}" type="datetimeFigureOut">
               <a:rPr lang="en-US" smtClean="0"/>
-              <a:t>5/24/16</a:t>
+              <a:t>5/26/16</a:t>
             </a:fld>
             <a:endParaRPr lang="en-US"/>
           </a:p>
@@ -1726,7 +1726,7 @@
           <a:p>
             <a:fld id="{4A455F30-BFD7-C44C-A532-EC0FD0695260}" type="datetimeFigureOut">
               <a:rPr lang="en-US" smtClean="0"/>
-              <a:t>5/24/16</a:t>
+              <a:t>5/26/16</a:t>
             </a:fld>
             <a:endParaRPr lang="en-US"/>
           </a:p>
@@ -1821,7 +1821,7 @@
           <a:p>
             <a:fld id="{4A455F30-BFD7-C44C-A532-EC0FD0695260}" type="datetimeFigureOut">
               <a:rPr lang="en-US" smtClean="0"/>
-              <a:t>5/24/16</a:t>
+              <a:t>5/26/16</a:t>
             </a:fld>
             <a:endParaRPr lang="en-US"/>
           </a:p>
@@ -2098,7 +2098,7 @@
           <a:p>
             <a:fld id="{4A455F30-BFD7-C44C-A532-EC0FD0695260}" type="datetimeFigureOut">
               <a:rPr lang="en-US" smtClean="0"/>
-              <a:t>5/24/16</a:t>
+              <a:t>5/26/16</a:t>
             </a:fld>
             <a:endParaRPr lang="en-US"/>
           </a:p>
@@ -2351,7 +2351,7 @@
           <a:p>
             <a:fld id="{4A455F30-BFD7-C44C-A532-EC0FD0695260}" type="datetimeFigureOut">
               <a:rPr lang="en-US" smtClean="0"/>
-              <a:t>5/24/16</a:t>
+              <a:t>5/26/16</a:t>
             </a:fld>
             <a:endParaRPr lang="en-US"/>
           </a:p>
@@ -2564,7 +2564,7 @@
           <a:p>
             <a:fld id="{4A455F30-BFD7-C44C-A532-EC0FD0695260}" type="datetimeFigureOut">
               <a:rPr lang="en-US" smtClean="0"/>
-              <a:t>5/24/16</a:t>
+              <a:t>5/26/16</a:t>
             </a:fld>
             <a:endParaRPr lang="en-US"/>
           </a:p>
@@ -2978,9 +2978,9 @@
         <p:grpSpPr>
           <a:xfrm>
             <a:off x="582884" y="628650"/>
-            <a:ext cx="1234533" cy="1471613"/>
+            <a:ext cx="1234533" cy="1573346"/>
             <a:chOff x="582884" y="628650"/>
-            <a:chExt cx="1234533" cy="1471613"/>
+            <a:chExt cx="1234533" cy="1573346"/>
           </a:xfrm>
         </p:grpSpPr>
         <p:sp>
@@ -3103,7 +3103,7 @@
           <p:spPr>
             <a:xfrm>
               <a:off x="614659" y="1001667"/>
-              <a:ext cx="662361" cy="830997"/>
+              <a:ext cx="612668" cy="1200329"/>
             </a:xfrm>
             <a:prstGeom prst="rect">
               <a:avLst/>
@@ -3140,25 +3140,24 @@
               </a:r>
             </a:p>
             <a:p>
-              <a:r>
-                <a:rPr lang="en-US" altLang="zh-CN" sz="800" dirty="0" smtClean="0"/>
-                <a:t>Level</a:t>
-              </a:r>
-              <a:r>
-                <a:rPr lang="zh-CN" altLang="en-US" sz="800" dirty="0" smtClean="0"/>
-                <a:t> </a:t>
-              </a:r>
-              <a:r>
-                <a:rPr lang="en-US" altLang="zh-CN" sz="800" dirty="0" smtClean="0"/>
-                <a:t>(</a:t>
-              </a:r>
-              <a:r>
-                <a:rPr lang="en-US" altLang="zh-CN" sz="800" dirty="0" err="1" smtClean="0"/>
-                <a:t>exp</a:t>
-              </a:r>
-              <a:r>
-                <a:rPr lang="en-US" altLang="zh-CN" sz="800" dirty="0" smtClean="0"/>
-                <a:t>):</a:t>
+              <a:endParaRPr lang="en-US" altLang="zh-CN" sz="800" dirty="0" smtClean="0"/>
+            </a:p>
+            <a:p>
+              <a:r>
+                <a:rPr lang="en-US" altLang="zh-CN" sz="800" dirty="0" smtClean="0"/>
+                <a:t>Bio:</a:t>
+              </a:r>
+            </a:p>
+            <a:p>
+              <a:r>
+                <a:rPr lang="en-US" altLang="zh-CN" sz="800" dirty="0" smtClean="0"/>
+                <a:t>Self-intro</a:t>
+              </a:r>
+            </a:p>
+            <a:p>
+              <a:r>
+                <a:rPr lang="en-US" altLang="zh-CN" sz="800" dirty="0" smtClean="0"/>
+                <a:t>Sex</a:t>
               </a:r>
             </a:p>
             <a:p>
@@ -3175,7 +3174,7 @@
         </p:nvGrpSpPr>
         <p:grpSpPr>
           <a:xfrm>
-            <a:off x="3137797" y="628650"/>
+            <a:off x="3703608" y="840633"/>
             <a:ext cx="1542691" cy="1471613"/>
             <a:chOff x="582884" y="628650"/>
             <a:chExt cx="1542691" cy="1471613"/>
@@ -4665,7 +4664,6 @@
                 <a:rPr lang="en-US" altLang="zh-CN" sz="800" dirty="0" smtClean="0"/>
                 <a:t>content</a:t>
               </a:r>
-              <a:endParaRPr lang="en-US" altLang="zh-CN" sz="800" dirty="0" smtClean="0"/>
             </a:p>
           </p:txBody>
         </p:sp>
@@ -6361,6 +6359,244 @@
                 <a:t>)</a:t>
               </a:r>
               <a:endParaRPr lang="en-US" dirty="0"/>
+            </a:p>
+          </p:txBody>
+        </p:sp>
+      </p:grpSp>
+      <p:grpSp>
+        <p:nvGrpSpPr>
+          <p:cNvPr id="104" name="Group 103"/>
+          <p:cNvGrpSpPr/>
+          <p:nvPr/>
+        </p:nvGrpSpPr>
+        <p:grpSpPr>
+          <a:xfrm>
+            <a:off x="2025927" y="39462"/>
+            <a:ext cx="1542691" cy="1471613"/>
+            <a:chOff x="582884" y="628650"/>
+            <a:chExt cx="1542691" cy="1471613"/>
+          </a:xfrm>
+        </p:grpSpPr>
+        <p:sp>
+          <p:nvSpPr>
+            <p:cNvPr id="105" name="Rectangle 104"/>
+            <p:cNvSpPr/>
+            <p:nvPr/>
+          </p:nvSpPr>
+          <p:spPr>
+            <a:xfrm>
+              <a:off x="585788" y="628650"/>
+              <a:ext cx="1539787" cy="1471613"/>
+            </a:xfrm>
+            <a:prstGeom prst="rect">
+              <a:avLst/>
+            </a:prstGeom>
+            <a:noFill/>
+            <a:ln>
+              <a:solidFill>
+                <a:schemeClr val="accent2"/>
+              </a:solidFill>
+            </a:ln>
+          </p:spPr>
+          <p:style>
+            <a:lnRef idx="2">
+              <a:schemeClr val="accent1">
+                <a:shade val="50000"/>
+              </a:schemeClr>
+            </a:lnRef>
+            <a:fillRef idx="1">
+              <a:schemeClr val="accent1"/>
+            </a:fillRef>
+            <a:effectRef idx="0">
+              <a:schemeClr val="accent1"/>
+            </a:effectRef>
+            <a:fontRef idx="minor">
+              <a:schemeClr val="lt1"/>
+            </a:fontRef>
+          </p:style>
+          <p:txBody>
+            <a:bodyPr rtlCol="0" anchor="ctr"/>
+            <a:lstStyle/>
+            <a:p>
+              <a:pPr algn="ctr"/>
+              <a:endParaRPr lang="en-US"/>
+            </a:p>
+          </p:txBody>
+        </p:sp>
+        <p:cxnSp>
+          <p:nvCxnSpPr>
+            <p:cNvPr id="109" name="Straight Connector 108"/>
+            <p:cNvCxnSpPr/>
+            <p:nvPr/>
+          </p:nvCxnSpPr>
+          <p:spPr>
+            <a:xfrm>
+              <a:off x="588100" y="940959"/>
+              <a:ext cx="1229317" cy="3795"/>
+            </a:xfrm>
+            <a:prstGeom prst="line">
+              <a:avLst/>
+            </a:prstGeom>
+            <a:ln>
+              <a:solidFill>
+                <a:schemeClr val="accent2"/>
+              </a:solidFill>
+            </a:ln>
+          </p:spPr>
+          <p:style>
+            <a:lnRef idx="1">
+              <a:schemeClr val="accent1"/>
+            </a:lnRef>
+            <a:fillRef idx="0">
+              <a:schemeClr val="accent1"/>
+            </a:fillRef>
+            <a:effectRef idx="0">
+              <a:schemeClr val="accent1"/>
+            </a:effectRef>
+            <a:fontRef idx="minor">
+              <a:schemeClr val="tx1"/>
+            </a:fontRef>
+          </p:style>
+        </p:cxnSp>
+        <p:sp>
+          <p:nvSpPr>
+            <p:cNvPr id="110" name="TextBox 109"/>
+            <p:cNvSpPr txBox="1"/>
+            <p:nvPr/>
+          </p:nvSpPr>
+          <p:spPr>
+            <a:xfrm>
+              <a:off x="582884" y="628650"/>
+              <a:ext cx="1231629" cy="307777"/>
+            </a:xfrm>
+            <a:prstGeom prst="rect">
+              <a:avLst/>
+            </a:prstGeom>
+            <a:noFill/>
+          </p:spPr>
+          <p:txBody>
+            <a:bodyPr wrap="square" rtlCol="0">
+              <a:spAutoFit/>
+            </a:bodyPr>
+            <a:lstStyle/>
+            <a:p>
+              <a:r>
+                <a:rPr lang="en-US" altLang="zh-CN" sz="1400" dirty="0" err="1" smtClean="0"/>
+                <a:t>UserSetting</a:t>
+              </a:r>
+              <a:endParaRPr lang="en-US" sz="1400" dirty="0"/>
+            </a:p>
+          </p:txBody>
+        </p:sp>
+        <p:sp>
+          <p:nvSpPr>
+            <p:cNvPr id="111" name="TextBox 110"/>
+            <p:cNvSpPr txBox="1"/>
+            <p:nvPr/>
+          </p:nvSpPr>
+          <p:spPr>
+            <a:xfrm>
+              <a:off x="614659" y="1001667"/>
+              <a:ext cx="1449436" cy="830997"/>
+            </a:xfrm>
+            <a:prstGeom prst="rect">
+              <a:avLst/>
+            </a:prstGeom>
+            <a:noFill/>
+          </p:spPr>
+          <p:txBody>
+            <a:bodyPr wrap="none" rtlCol="0">
+              <a:spAutoFit/>
+            </a:bodyPr>
+            <a:lstStyle/>
+            <a:p>
+              <a:r>
+                <a:rPr lang="en-US" altLang="zh-CN" sz="800" dirty="0" smtClean="0"/>
+                <a:t>ID:</a:t>
+              </a:r>
+            </a:p>
+            <a:p>
+              <a:r>
+                <a:rPr lang="en-US" altLang="zh-CN" sz="800" dirty="0" err="1" smtClean="0"/>
+                <a:t>Setting_name</a:t>
+              </a:r>
+              <a:r>
+                <a:rPr lang="en-US" altLang="zh-CN" sz="800" dirty="0" smtClean="0"/>
+                <a:t>:</a:t>
+              </a:r>
+              <a:r>
+                <a:rPr lang="zh-CN" altLang="en-US" sz="800" dirty="0" smtClean="0"/>
+                <a:t> </a:t>
+              </a:r>
+              <a:r>
+                <a:rPr lang="en-US" altLang="zh-CN" sz="800" dirty="0" smtClean="0"/>
+                <a:t>(</a:t>
+              </a:r>
+              <a:r>
+                <a:rPr lang="en-US" altLang="zh-CN" sz="800" dirty="0" err="1" smtClean="0"/>
+                <a:t>setting_name</a:t>
+              </a:r>
+              <a:r>
+                <a:rPr lang="en-US" altLang="zh-CN" sz="800" dirty="0" smtClean="0"/>
+                <a:t>)</a:t>
+              </a:r>
+            </a:p>
+            <a:p>
+              <a:r>
+                <a:rPr lang="en-US" altLang="zh-CN" sz="800" dirty="0" smtClean="0"/>
+                <a:t>type:</a:t>
+              </a:r>
+              <a:r>
+                <a:rPr lang="zh-CN" altLang="en-US" sz="800" dirty="0" smtClean="0"/>
+                <a:t> </a:t>
+              </a:r>
+              <a:r>
+                <a:rPr lang="en-US" altLang="zh-CN" sz="800" dirty="0" smtClean="0"/>
+                <a:t>(array/</a:t>
+              </a:r>
+              <a:r>
+                <a:rPr lang="en-US" altLang="zh-CN" sz="800" dirty="0" err="1" smtClean="0"/>
+                <a:t>boolean</a:t>
+              </a:r>
+              <a:r>
+                <a:rPr lang="en-US" altLang="zh-CN" sz="800" dirty="0" smtClean="0"/>
+                <a:t>/Integer)</a:t>
+              </a:r>
+            </a:p>
+            <a:p>
+              <a:r>
+                <a:rPr lang="en-US" altLang="zh-CN" sz="800" dirty="0" smtClean="0"/>
+                <a:t>data:</a:t>
+              </a:r>
+              <a:r>
+                <a:rPr lang="zh-CN" altLang="en-US" sz="800" dirty="0" smtClean="0"/>
+                <a:t> </a:t>
+              </a:r>
+              <a:r>
+                <a:rPr lang="en-US" altLang="zh-CN" sz="800" dirty="0" smtClean="0"/>
+                <a:t>(JSON</a:t>
+              </a:r>
+              <a:r>
+                <a:rPr lang="zh-CN" altLang="en-US" sz="800" dirty="0" smtClean="0"/>
+                <a:t> </a:t>
+              </a:r>
+              <a:r>
+                <a:rPr lang="en-US" altLang="zh-CN" sz="800" dirty="0" smtClean="0"/>
+                <a:t>data)</a:t>
+              </a:r>
+            </a:p>
+            <a:p>
+              <a:r>
+                <a:rPr lang="en-US" altLang="zh-CN" sz="800" dirty="0" err="1" smtClean="0"/>
+                <a:t>User_id</a:t>
+              </a:r>
+              <a:r>
+                <a:rPr lang="en-US" altLang="zh-CN" sz="800" dirty="0" smtClean="0"/>
+                <a:t>:</a:t>
+              </a:r>
+            </a:p>
+            <a:p>
+              <a:endParaRPr lang="en-US" altLang="zh-CN" sz="800" dirty="0" smtClean="0"/>
             </a:p>
           </p:txBody>
         </p:sp>

</xml_diff>

<commit_message>
update possible datebase structure
</commit_message>
<xml_diff>
--- a/database_structure.pptx
+++ b/database_structure.pptx
@@ -243,7 +243,7 @@
           <a:p>
             <a:fld id="{4A455F30-BFD7-C44C-A532-EC0FD0695260}" type="datetimeFigureOut">
               <a:rPr lang="en-US" smtClean="0"/>
-              <a:t>5/26/16</a:t>
+              <a:t>6/16/16</a:t>
             </a:fld>
             <a:endParaRPr lang="en-US"/>
           </a:p>
@@ -413,7 +413,7 @@
           <a:p>
             <a:fld id="{4A455F30-BFD7-C44C-A532-EC0FD0695260}" type="datetimeFigureOut">
               <a:rPr lang="en-US" smtClean="0"/>
-              <a:t>5/26/16</a:t>
+              <a:t>6/16/16</a:t>
             </a:fld>
             <a:endParaRPr lang="en-US"/>
           </a:p>
@@ -593,7 +593,7 @@
           <a:p>
             <a:fld id="{4A455F30-BFD7-C44C-A532-EC0FD0695260}" type="datetimeFigureOut">
               <a:rPr lang="en-US" smtClean="0"/>
-              <a:t>5/26/16</a:t>
+              <a:t>6/16/16</a:t>
             </a:fld>
             <a:endParaRPr lang="en-US"/>
           </a:p>
@@ -763,7 +763,7 @@
           <a:p>
             <a:fld id="{4A455F30-BFD7-C44C-A532-EC0FD0695260}" type="datetimeFigureOut">
               <a:rPr lang="en-US" smtClean="0"/>
-              <a:t>5/26/16</a:t>
+              <a:t>6/16/16</a:t>
             </a:fld>
             <a:endParaRPr lang="en-US"/>
           </a:p>
@@ -1009,7 +1009,7 @@
           <a:p>
             <a:fld id="{4A455F30-BFD7-C44C-A532-EC0FD0695260}" type="datetimeFigureOut">
               <a:rPr lang="en-US" smtClean="0"/>
-              <a:t>5/26/16</a:t>
+              <a:t>6/16/16</a:t>
             </a:fld>
             <a:endParaRPr lang="en-US"/>
           </a:p>
@@ -1241,7 +1241,7 @@
           <a:p>
             <a:fld id="{4A455F30-BFD7-C44C-A532-EC0FD0695260}" type="datetimeFigureOut">
               <a:rPr lang="en-US" smtClean="0"/>
-              <a:t>5/26/16</a:t>
+              <a:t>6/16/16</a:t>
             </a:fld>
             <a:endParaRPr lang="en-US"/>
           </a:p>
@@ -1608,7 +1608,7 @@
           <a:p>
             <a:fld id="{4A455F30-BFD7-C44C-A532-EC0FD0695260}" type="datetimeFigureOut">
               <a:rPr lang="en-US" smtClean="0"/>
-              <a:t>5/26/16</a:t>
+              <a:t>6/16/16</a:t>
             </a:fld>
             <a:endParaRPr lang="en-US"/>
           </a:p>
@@ -1726,7 +1726,7 @@
           <a:p>
             <a:fld id="{4A455F30-BFD7-C44C-A532-EC0FD0695260}" type="datetimeFigureOut">
               <a:rPr lang="en-US" smtClean="0"/>
-              <a:t>5/26/16</a:t>
+              <a:t>6/16/16</a:t>
             </a:fld>
             <a:endParaRPr lang="en-US"/>
           </a:p>
@@ -1821,7 +1821,7 @@
           <a:p>
             <a:fld id="{4A455F30-BFD7-C44C-A532-EC0FD0695260}" type="datetimeFigureOut">
               <a:rPr lang="en-US" smtClean="0"/>
-              <a:t>5/26/16</a:t>
+              <a:t>6/16/16</a:t>
             </a:fld>
             <a:endParaRPr lang="en-US"/>
           </a:p>
@@ -2098,7 +2098,7 @@
           <a:p>
             <a:fld id="{4A455F30-BFD7-C44C-A532-EC0FD0695260}" type="datetimeFigureOut">
               <a:rPr lang="en-US" smtClean="0"/>
-              <a:t>5/26/16</a:t>
+              <a:t>6/16/16</a:t>
             </a:fld>
             <a:endParaRPr lang="en-US"/>
           </a:p>
@@ -2351,7 +2351,7 @@
           <a:p>
             <a:fld id="{4A455F30-BFD7-C44C-A532-EC0FD0695260}" type="datetimeFigureOut">
               <a:rPr lang="en-US" smtClean="0"/>
-              <a:t>5/26/16</a:t>
+              <a:t>6/16/16</a:t>
             </a:fld>
             <a:endParaRPr lang="en-US"/>
           </a:p>
@@ -2564,7 +2564,7 @@
           <a:p>
             <a:fld id="{4A455F30-BFD7-C44C-A532-EC0FD0695260}" type="datetimeFigureOut">
               <a:rPr lang="en-US" smtClean="0"/>
-              <a:t>5/26/16</a:t>
+              <a:t>6/16/16</a:t>
             </a:fld>
             <a:endParaRPr lang="en-US"/>
           </a:p>
@@ -3168,251 +3168,13 @@
       </p:grpSp>
       <p:grpSp>
         <p:nvGrpSpPr>
-          <p:cNvPr id="11" name="Group 10"/>
-          <p:cNvGrpSpPr/>
-          <p:nvPr/>
-        </p:nvGrpSpPr>
-        <p:grpSpPr>
-          <a:xfrm>
-            <a:off x="3703608" y="840633"/>
-            <a:ext cx="1542691" cy="1471613"/>
-            <a:chOff x="582884" y="628650"/>
-            <a:chExt cx="1542691" cy="1471613"/>
-          </a:xfrm>
-        </p:grpSpPr>
-        <p:sp>
-          <p:nvSpPr>
-            <p:cNvPr id="12" name="Rectangle 11"/>
-            <p:cNvSpPr/>
-            <p:nvPr/>
-          </p:nvSpPr>
-          <p:spPr>
-            <a:xfrm>
-              <a:off x="585788" y="628650"/>
-              <a:ext cx="1539787" cy="1471613"/>
-            </a:xfrm>
-            <a:prstGeom prst="rect">
-              <a:avLst/>
-            </a:prstGeom>
-            <a:noFill/>
-            <a:ln>
-              <a:solidFill>
-                <a:schemeClr val="accent2"/>
-              </a:solidFill>
-            </a:ln>
-          </p:spPr>
-          <p:style>
-            <a:lnRef idx="2">
-              <a:schemeClr val="accent1">
-                <a:shade val="50000"/>
-              </a:schemeClr>
-            </a:lnRef>
-            <a:fillRef idx="1">
-              <a:schemeClr val="accent1"/>
-            </a:fillRef>
-            <a:effectRef idx="0">
-              <a:schemeClr val="accent1"/>
-            </a:effectRef>
-            <a:fontRef idx="minor">
-              <a:schemeClr val="lt1"/>
-            </a:fontRef>
-          </p:style>
-          <p:txBody>
-            <a:bodyPr rtlCol="0" anchor="ctr"/>
-            <a:lstStyle/>
-            <a:p>
-              <a:pPr algn="ctr"/>
-              <a:endParaRPr lang="en-US"/>
-            </a:p>
-          </p:txBody>
-        </p:sp>
-        <p:cxnSp>
-          <p:nvCxnSpPr>
-            <p:cNvPr id="13" name="Straight Connector 12"/>
-            <p:cNvCxnSpPr/>
-            <p:nvPr/>
-          </p:nvCxnSpPr>
-          <p:spPr>
-            <a:xfrm>
-              <a:off x="588100" y="940959"/>
-              <a:ext cx="1229317" cy="3795"/>
-            </a:xfrm>
-            <a:prstGeom prst="line">
-              <a:avLst/>
-            </a:prstGeom>
-            <a:ln>
-              <a:solidFill>
-                <a:schemeClr val="accent2"/>
-              </a:solidFill>
-            </a:ln>
-          </p:spPr>
-          <p:style>
-            <a:lnRef idx="1">
-              <a:schemeClr val="accent1"/>
-            </a:lnRef>
-            <a:fillRef idx="0">
-              <a:schemeClr val="accent1"/>
-            </a:fillRef>
-            <a:effectRef idx="0">
-              <a:schemeClr val="accent1"/>
-            </a:effectRef>
-            <a:fontRef idx="minor">
-              <a:schemeClr val="tx1"/>
-            </a:fontRef>
-          </p:style>
-        </p:cxnSp>
-        <p:sp>
-          <p:nvSpPr>
-            <p:cNvPr id="14" name="TextBox 13"/>
-            <p:cNvSpPr txBox="1"/>
-            <p:nvPr/>
-          </p:nvSpPr>
-          <p:spPr>
-            <a:xfrm>
-              <a:off x="582884" y="628650"/>
-              <a:ext cx="1231629" cy="307777"/>
-            </a:xfrm>
-            <a:prstGeom prst="rect">
-              <a:avLst/>
-            </a:prstGeom>
-            <a:noFill/>
-          </p:spPr>
-          <p:txBody>
-            <a:bodyPr wrap="square" rtlCol="0">
-              <a:spAutoFit/>
-            </a:bodyPr>
-            <a:lstStyle/>
-            <a:p>
-              <a:r>
-                <a:rPr lang="en-US" altLang="zh-CN" sz="1400" dirty="0" err="1" smtClean="0"/>
-                <a:t>UserSetting</a:t>
-              </a:r>
-              <a:endParaRPr lang="en-US" sz="1400" dirty="0"/>
-            </a:p>
-          </p:txBody>
-        </p:sp>
-        <p:sp>
-          <p:nvSpPr>
-            <p:cNvPr id="15" name="TextBox 14"/>
-            <p:cNvSpPr txBox="1"/>
-            <p:nvPr/>
-          </p:nvSpPr>
-          <p:spPr>
-            <a:xfrm>
-              <a:off x="614659" y="1001667"/>
-              <a:ext cx="1449436" cy="830997"/>
-            </a:xfrm>
-            <a:prstGeom prst="rect">
-              <a:avLst/>
-            </a:prstGeom>
-            <a:noFill/>
-          </p:spPr>
-          <p:txBody>
-            <a:bodyPr wrap="none" rtlCol="0">
-              <a:spAutoFit/>
-            </a:bodyPr>
-            <a:lstStyle/>
-            <a:p>
-              <a:r>
-                <a:rPr lang="en-US" altLang="zh-CN" sz="800" dirty="0" smtClean="0"/>
-                <a:t>ID:</a:t>
-              </a:r>
-            </a:p>
-            <a:p>
-              <a:r>
-                <a:rPr lang="en-US" altLang="zh-CN" sz="800" dirty="0" err="1" smtClean="0"/>
-                <a:t>Setting_name</a:t>
-              </a:r>
-              <a:r>
-                <a:rPr lang="en-US" altLang="zh-CN" sz="800" dirty="0" smtClean="0"/>
-                <a:t>:</a:t>
-              </a:r>
-              <a:r>
-                <a:rPr lang="zh-CN" altLang="en-US" sz="800" dirty="0" smtClean="0"/>
-                <a:t> </a:t>
-              </a:r>
-              <a:r>
-                <a:rPr lang="en-US" altLang="zh-CN" sz="800" dirty="0" smtClean="0"/>
-                <a:t>(</a:t>
-              </a:r>
-              <a:r>
-                <a:rPr lang="en-US" altLang="zh-CN" sz="800" dirty="0" err="1" smtClean="0"/>
-                <a:t>setting_name</a:t>
-              </a:r>
-              <a:r>
-                <a:rPr lang="en-US" altLang="zh-CN" sz="800" dirty="0" smtClean="0"/>
-                <a:t>)</a:t>
-              </a:r>
-            </a:p>
-            <a:p>
-              <a:r>
-                <a:rPr lang="en-US" altLang="zh-CN" sz="800" dirty="0" smtClean="0"/>
-                <a:t>type:</a:t>
-              </a:r>
-              <a:r>
-                <a:rPr lang="zh-CN" altLang="en-US" sz="800" dirty="0" smtClean="0"/>
-                <a:t> </a:t>
-              </a:r>
-              <a:r>
-                <a:rPr lang="en-US" altLang="zh-CN" sz="800" dirty="0" smtClean="0"/>
-                <a:t>(array/</a:t>
-              </a:r>
-              <a:r>
-                <a:rPr lang="en-US" altLang="zh-CN" sz="800" dirty="0" err="1" smtClean="0"/>
-                <a:t>boolean</a:t>
-              </a:r>
-              <a:r>
-                <a:rPr lang="en-US" altLang="zh-CN" sz="800" dirty="0" smtClean="0"/>
-                <a:t>/Integer)</a:t>
-              </a:r>
-            </a:p>
-            <a:p>
-              <a:r>
-                <a:rPr lang="en-US" altLang="zh-CN" sz="800" dirty="0" smtClean="0"/>
-                <a:t>data:</a:t>
-              </a:r>
-              <a:r>
-                <a:rPr lang="zh-CN" altLang="en-US" sz="800" dirty="0" smtClean="0"/>
-                <a:t> </a:t>
-              </a:r>
-              <a:r>
-                <a:rPr lang="en-US" altLang="zh-CN" sz="800" dirty="0" smtClean="0"/>
-                <a:t>(JSON</a:t>
-              </a:r>
-              <a:r>
-                <a:rPr lang="zh-CN" altLang="en-US" sz="800" dirty="0" smtClean="0"/>
-                <a:t> </a:t>
-              </a:r>
-              <a:r>
-                <a:rPr lang="en-US" altLang="zh-CN" sz="800" dirty="0" smtClean="0"/>
-                <a:t>data)</a:t>
-              </a:r>
-            </a:p>
-            <a:p>
-              <a:r>
-                <a:rPr lang="en-US" altLang="zh-CN" sz="800" dirty="0" err="1" smtClean="0"/>
-                <a:t>User_id</a:t>
-              </a:r>
-              <a:r>
-                <a:rPr lang="en-US" altLang="zh-CN" sz="800" dirty="0" smtClean="0"/>
-                <a:t>:</a:t>
-              </a:r>
-            </a:p>
-            <a:p>
-              <a:endParaRPr lang="en-US" altLang="zh-CN" sz="800" dirty="0" smtClean="0"/>
-            </a:p>
-          </p:txBody>
-        </p:sp>
-      </p:grpSp>
-      <p:grpSp>
-        <p:nvGrpSpPr>
           <p:cNvPr id="16" name="Group 15"/>
           <p:cNvGrpSpPr/>
           <p:nvPr/>
         </p:nvGrpSpPr>
         <p:grpSpPr>
           <a:xfrm>
-            <a:off x="5546118" y="2837484"/>
+            <a:off x="3694409" y="2828002"/>
             <a:ext cx="1234533" cy="1573346"/>
             <a:chOff x="582884" y="628650"/>
             <a:chExt cx="1234533" cy="1573346"/>
@@ -3621,7 +3383,7 @@
         </p:nvGrpSpPr>
         <p:grpSpPr>
           <a:xfrm>
-            <a:off x="7921066" y="2837484"/>
+            <a:off x="5837592" y="2579625"/>
             <a:ext cx="1234533" cy="1471613"/>
             <a:chOff x="582884" y="628650"/>
             <a:chExt cx="1234533" cy="1471613"/>
@@ -3731,8 +3493,12 @@
             <a:lstStyle/>
             <a:p>
               <a:r>
+                <a:rPr lang="en-US" altLang="zh-CN" sz="1400" dirty="0"/>
+                <a:t>R</a:t>
+              </a:r>
+              <a:r>
                 <a:rPr lang="en-US" altLang="zh-CN" sz="1400" dirty="0" smtClean="0"/>
-                <a:t>Comment</a:t>
+                <a:t>eply</a:t>
               </a:r>
               <a:endParaRPr lang="en-US" sz="1400" dirty="0"/>
             </a:p>
@@ -3747,7 +3513,7 @@
           <p:spPr>
             <a:xfrm>
               <a:off x="614659" y="1001667"/>
-              <a:ext cx="612668" cy="707886"/>
+              <a:ext cx="510076" cy="461665"/>
             </a:xfrm>
             <a:prstGeom prst="rect">
               <a:avLst/>
@@ -3767,21 +3533,10 @@
             </a:p>
             <a:p>
               <a:r>
-                <a:rPr lang="en-US" altLang="zh-CN" sz="800" dirty="0" smtClean="0"/>
-                <a:t>Name:</a:t>
-              </a:r>
-            </a:p>
-            <a:p>
-              <a:r>
-                <a:rPr lang="en-US" altLang="zh-CN" sz="800" dirty="0" smtClean="0"/>
-                <a:t>Password:</a:t>
-              </a:r>
-            </a:p>
-            <a:p>
-              <a:r>
-                <a:rPr lang="en-US" altLang="zh-CN" sz="800" dirty="0" smtClean="0"/>
-                <a:t>Email:</a:t>
-              </a:r>
+                <a:rPr lang="en-US" altLang="zh-CN" sz="800" smtClean="0"/>
+                <a:t>content</a:t>
+              </a:r>
+              <a:endParaRPr lang="en-US" altLang="zh-CN" sz="800" dirty="0" smtClean="0"/>
             </a:p>
             <a:p>
               <a:endParaRPr lang="en-US" altLang="zh-CN" sz="800" dirty="0" smtClean="0"/>
@@ -3797,7 +3552,7 @@
         </p:nvGrpSpPr>
         <p:grpSpPr>
           <a:xfrm>
-            <a:off x="7889291" y="610956"/>
+            <a:off x="5740669" y="459812"/>
             <a:ext cx="1234533" cy="1471613"/>
             <a:chOff x="582884" y="628650"/>
             <a:chExt cx="1234533" cy="1471613"/>
@@ -3908,15 +3663,7 @@
             <a:p>
               <a:r>
                 <a:rPr lang="en-US" altLang="zh-CN" sz="1400" dirty="0" smtClean="0"/>
-                <a:t>Tag</a:t>
-              </a:r>
-              <a:r>
-                <a:rPr lang="zh-CN" altLang="en-US" sz="1400" dirty="0" smtClean="0"/>
-                <a:t> </a:t>
-              </a:r>
-              <a:r>
-                <a:rPr lang="en-US" altLang="zh-CN" sz="1400" dirty="0" smtClean="0"/>
-                <a:t>(Topic)</a:t>
+                <a:t>Topic</a:t>
               </a:r>
               <a:endParaRPr lang="en-US" sz="1400" dirty="0"/>
             </a:p>
@@ -4133,7 +3880,7 @@
         </p:nvGrpSpPr>
         <p:grpSpPr>
           <a:xfrm>
-            <a:off x="5386505" y="925162"/>
+            <a:off x="3691719" y="925162"/>
             <a:ext cx="1234533" cy="1471613"/>
             <a:chOff x="582884" y="628650"/>
             <a:chExt cx="1234533" cy="1471613"/>
@@ -4259,7 +4006,7 @@
           <p:spPr>
             <a:xfrm>
               <a:off x="614659" y="1001667"/>
-              <a:ext cx="1119240" cy="954107"/>
+              <a:ext cx="1119240" cy="461665"/>
             </a:xfrm>
             <a:prstGeom prst="rect">
               <a:avLst/>
@@ -4286,32 +4033,12 @@
             <a:p>
               <a:r>
                 <a:rPr lang="en-US" altLang="zh-CN" sz="800" dirty="0" smtClean="0"/>
-                <a:t>description:</a:t>
-              </a:r>
-            </a:p>
-            <a:p>
-              <a:r>
-                <a:rPr lang="en-US" altLang="zh-CN" sz="800" dirty="0" err="1" smtClean="0"/>
-                <a:t>User_id</a:t>
+                <a:t>description</a:t>
               </a:r>
               <a:r>
                 <a:rPr lang="en-US" altLang="zh-CN" sz="800" dirty="0" smtClean="0"/>
                 <a:t>:</a:t>
               </a:r>
-            </a:p>
-            <a:p>
-              <a:r>
-                <a:rPr lang="en-US" altLang="zh-CN" sz="800" dirty="0" smtClean="0"/>
-                <a:t>Vote:</a:t>
-              </a:r>
-            </a:p>
-            <a:p>
-              <a:r>
-                <a:rPr lang="en-US" altLang="zh-CN" sz="800" dirty="0" smtClean="0"/>
-                <a:t>Dislike:</a:t>
-              </a:r>
-            </a:p>
-            <a:p>
               <a:endParaRPr lang="en-US" altLang="zh-CN" sz="800" dirty="0" smtClean="0"/>
             </a:p>
           </p:txBody>
@@ -4325,7 +4052,7 @@
         </p:nvGrpSpPr>
         <p:grpSpPr>
           <a:xfrm>
-            <a:off x="3137797" y="2837484"/>
+            <a:off x="8199482" y="881413"/>
             <a:ext cx="1465734" cy="1471613"/>
             <a:chOff x="582884" y="628650"/>
             <a:chExt cx="1234533" cy="1471613"/>
@@ -4814,7 +4541,7 @@
         </p:nvGrpSpPr>
         <p:grpSpPr>
           <a:xfrm>
-            <a:off x="3169572" y="4927542"/>
+            <a:off x="8217502" y="4351286"/>
             <a:ext cx="1234533" cy="1471613"/>
             <a:chOff x="582884" y="628650"/>
             <a:chExt cx="1234533" cy="1471613"/>
@@ -4984,7 +4711,7 @@
         </p:nvGrpSpPr>
         <p:grpSpPr>
           <a:xfrm>
-            <a:off x="5113026" y="4902765"/>
+            <a:off x="5925533" y="4733374"/>
             <a:ext cx="1234533" cy="1471613"/>
             <a:chOff x="582884" y="628650"/>
             <a:chExt cx="1234533" cy="1471613"/>
@@ -5480,184 +5207,13 @@
       </p:grpSp>
       <p:grpSp>
         <p:nvGrpSpPr>
-          <p:cNvPr id="83" name="Group 82"/>
-          <p:cNvGrpSpPr/>
-          <p:nvPr/>
-        </p:nvGrpSpPr>
-        <p:grpSpPr>
-          <a:xfrm>
-            <a:off x="6866702" y="2445276"/>
-            <a:ext cx="962505" cy="1128014"/>
-            <a:chOff x="582884" y="628650"/>
-            <a:chExt cx="1234533" cy="1471613"/>
-          </a:xfrm>
-        </p:grpSpPr>
-        <p:sp>
-          <p:nvSpPr>
-            <p:cNvPr id="84" name="Rectangle 83"/>
-            <p:cNvSpPr/>
-            <p:nvPr/>
-          </p:nvSpPr>
-          <p:spPr>
-            <a:xfrm>
-              <a:off x="585788" y="628650"/>
-              <a:ext cx="1228725" cy="1471613"/>
-            </a:xfrm>
-            <a:prstGeom prst="rect">
-              <a:avLst/>
-            </a:prstGeom>
-            <a:noFill/>
-            <a:ln>
-              <a:solidFill>
-                <a:schemeClr val="accent2"/>
-              </a:solidFill>
-            </a:ln>
-          </p:spPr>
-          <p:style>
-            <a:lnRef idx="2">
-              <a:schemeClr val="accent1">
-                <a:shade val="50000"/>
-              </a:schemeClr>
-            </a:lnRef>
-            <a:fillRef idx="1">
-              <a:schemeClr val="accent1"/>
-            </a:fillRef>
-            <a:effectRef idx="0">
-              <a:schemeClr val="accent1"/>
-            </a:effectRef>
-            <a:fontRef idx="minor">
-              <a:schemeClr val="lt1"/>
-            </a:fontRef>
-          </p:style>
-          <p:txBody>
-            <a:bodyPr rtlCol="0" anchor="ctr"/>
-            <a:lstStyle/>
-            <a:p>
-              <a:pPr algn="ctr"/>
-              <a:endParaRPr lang="en-US"/>
-            </a:p>
-          </p:txBody>
-        </p:sp>
-        <p:cxnSp>
-          <p:nvCxnSpPr>
-            <p:cNvPr id="85" name="Straight Connector 84"/>
-            <p:cNvCxnSpPr/>
-            <p:nvPr/>
-          </p:nvCxnSpPr>
-          <p:spPr>
-            <a:xfrm>
-              <a:off x="588100" y="940959"/>
-              <a:ext cx="1229317" cy="3795"/>
-            </a:xfrm>
-            <a:prstGeom prst="line">
-              <a:avLst/>
-            </a:prstGeom>
-            <a:ln>
-              <a:solidFill>
-                <a:schemeClr val="accent2"/>
-              </a:solidFill>
-            </a:ln>
-          </p:spPr>
-          <p:style>
-            <a:lnRef idx="1">
-              <a:schemeClr val="accent1"/>
-            </a:lnRef>
-            <a:fillRef idx="0">
-              <a:schemeClr val="accent1"/>
-            </a:fillRef>
-            <a:effectRef idx="0">
-              <a:schemeClr val="accent1"/>
-            </a:effectRef>
-            <a:fontRef idx="minor">
-              <a:schemeClr val="tx1"/>
-            </a:fontRef>
-          </p:style>
-        </p:cxnSp>
-        <p:sp>
-          <p:nvSpPr>
-            <p:cNvPr id="86" name="TextBox 85"/>
-            <p:cNvSpPr txBox="1"/>
-            <p:nvPr/>
-          </p:nvSpPr>
-          <p:spPr>
-            <a:xfrm>
-              <a:off x="582884" y="628650"/>
-              <a:ext cx="1231629" cy="401527"/>
-            </a:xfrm>
-            <a:prstGeom prst="rect">
-              <a:avLst/>
-            </a:prstGeom>
-            <a:noFill/>
-          </p:spPr>
-          <p:txBody>
-            <a:bodyPr wrap="square" rtlCol="0">
-              <a:spAutoFit/>
-            </a:bodyPr>
-            <a:lstStyle/>
-            <a:p>
-              <a:r>
-                <a:rPr lang="en-US" altLang="zh-CN" sz="1400"/>
-                <a:t>D</a:t>
-              </a:r>
-              <a:r>
-                <a:rPr lang="en-US" altLang="zh-CN" sz="1400" smtClean="0"/>
-                <a:t>raft</a:t>
-              </a:r>
-              <a:endParaRPr lang="en-US" sz="1400" dirty="0"/>
-            </a:p>
-          </p:txBody>
-        </p:sp>
-        <p:sp>
-          <p:nvSpPr>
-            <p:cNvPr id="87" name="TextBox 86"/>
-            <p:cNvSpPr txBox="1"/>
-            <p:nvPr/>
-          </p:nvSpPr>
-          <p:spPr>
-            <a:xfrm>
-              <a:off x="614659" y="1001667"/>
-              <a:ext cx="1059648" cy="461665"/>
-            </a:xfrm>
-            <a:prstGeom prst="rect">
-              <a:avLst/>
-            </a:prstGeom>
-            <a:noFill/>
-          </p:spPr>
-          <p:txBody>
-            <a:bodyPr wrap="square" rtlCol="0">
-              <a:spAutoFit/>
-            </a:bodyPr>
-            <a:lstStyle/>
-            <a:p>
-              <a:r>
-                <a:rPr lang="en-US" altLang="zh-CN" sz="800" dirty="0" smtClean="0"/>
-                <a:t>ID:</a:t>
-              </a:r>
-            </a:p>
-            <a:p>
-              <a:r>
-                <a:rPr lang="en-US" altLang="zh-CN" sz="800" dirty="0" smtClean="0"/>
-                <a:t>type:</a:t>
-              </a:r>
-            </a:p>
-            <a:p>
-              <a:r>
-                <a:rPr lang="en-US" altLang="zh-CN" sz="800" dirty="0" smtClean="0"/>
-                <a:t>Data:</a:t>
-              </a:r>
-            </a:p>
-          </p:txBody>
-        </p:sp>
-      </p:grpSp>
-      <p:grpSp>
-        <p:nvGrpSpPr>
           <p:cNvPr id="88" name="Group 87"/>
           <p:cNvGrpSpPr/>
           <p:nvPr/>
         </p:nvGrpSpPr>
         <p:grpSpPr>
           <a:xfrm>
-            <a:off x="6311892" y="59194"/>
+            <a:off x="10983760" y="925162"/>
             <a:ext cx="1109619" cy="850230"/>
             <a:chOff x="582884" y="628650"/>
             <a:chExt cx="1234533" cy="962538"/>
@@ -6371,7 +5927,7 @@
         </p:nvGrpSpPr>
         <p:grpSpPr>
           <a:xfrm>
-            <a:off x="2025927" y="39462"/>
+            <a:off x="8220406" y="2643972"/>
             <a:ext cx="1542691" cy="1471613"/>
             <a:chOff x="582884" y="628650"/>
             <a:chExt cx="1542691" cy="1471613"/>
@@ -6597,6 +6153,959 @@
             </a:p>
             <a:p>
               <a:endParaRPr lang="en-US" altLang="zh-CN" sz="800" dirty="0" smtClean="0"/>
+            </a:p>
+          </p:txBody>
+        </p:sp>
+      </p:grpSp>
+      <p:grpSp>
+        <p:nvGrpSpPr>
+          <p:cNvPr id="112" name="Group 111"/>
+          <p:cNvGrpSpPr/>
+          <p:nvPr/>
+        </p:nvGrpSpPr>
+        <p:grpSpPr>
+          <a:xfrm>
+            <a:off x="3363888" y="5001640"/>
+            <a:ext cx="1234533" cy="1471613"/>
+            <a:chOff x="582884" y="628650"/>
+            <a:chExt cx="1234533" cy="1471613"/>
+          </a:xfrm>
+        </p:grpSpPr>
+        <p:sp>
+          <p:nvSpPr>
+            <p:cNvPr id="113" name="Rectangle 112"/>
+            <p:cNvSpPr/>
+            <p:nvPr/>
+          </p:nvSpPr>
+          <p:spPr>
+            <a:xfrm>
+              <a:off x="585788" y="628650"/>
+              <a:ext cx="1228725" cy="1471613"/>
+            </a:xfrm>
+            <a:prstGeom prst="rect">
+              <a:avLst/>
+            </a:prstGeom>
+            <a:noFill/>
+            <a:ln>
+              <a:solidFill>
+                <a:schemeClr val="accent2"/>
+              </a:solidFill>
+            </a:ln>
+          </p:spPr>
+          <p:style>
+            <a:lnRef idx="2">
+              <a:schemeClr val="accent1">
+                <a:shade val="50000"/>
+              </a:schemeClr>
+            </a:lnRef>
+            <a:fillRef idx="1">
+              <a:schemeClr val="accent1"/>
+            </a:fillRef>
+            <a:effectRef idx="0">
+              <a:schemeClr val="accent1"/>
+            </a:effectRef>
+            <a:fontRef idx="minor">
+              <a:schemeClr val="lt1"/>
+            </a:fontRef>
+          </p:style>
+          <p:txBody>
+            <a:bodyPr rtlCol="0" anchor="ctr"/>
+            <a:lstStyle/>
+            <a:p>
+              <a:pPr algn="ctr"/>
+              <a:endParaRPr lang="en-US"/>
+            </a:p>
+          </p:txBody>
+        </p:sp>
+        <p:cxnSp>
+          <p:nvCxnSpPr>
+            <p:cNvPr id="114" name="Straight Connector 113"/>
+            <p:cNvCxnSpPr/>
+            <p:nvPr/>
+          </p:nvCxnSpPr>
+          <p:spPr>
+            <a:xfrm>
+              <a:off x="588100" y="940959"/>
+              <a:ext cx="1229317" cy="3795"/>
+            </a:xfrm>
+            <a:prstGeom prst="line">
+              <a:avLst/>
+            </a:prstGeom>
+            <a:ln>
+              <a:solidFill>
+                <a:schemeClr val="accent2"/>
+              </a:solidFill>
+            </a:ln>
+          </p:spPr>
+          <p:style>
+            <a:lnRef idx="1">
+              <a:schemeClr val="accent1"/>
+            </a:lnRef>
+            <a:fillRef idx="0">
+              <a:schemeClr val="accent1"/>
+            </a:fillRef>
+            <a:effectRef idx="0">
+              <a:schemeClr val="accent1"/>
+            </a:effectRef>
+            <a:fontRef idx="minor">
+              <a:schemeClr val="tx1"/>
+            </a:fontRef>
+          </p:style>
+        </p:cxnSp>
+        <p:sp>
+          <p:nvSpPr>
+            <p:cNvPr id="115" name="TextBox 114"/>
+            <p:cNvSpPr txBox="1"/>
+            <p:nvPr/>
+          </p:nvSpPr>
+          <p:spPr>
+            <a:xfrm>
+              <a:off x="582884" y="628650"/>
+              <a:ext cx="1231629" cy="307777"/>
+            </a:xfrm>
+            <a:prstGeom prst="rect">
+              <a:avLst/>
+            </a:prstGeom>
+            <a:noFill/>
+          </p:spPr>
+          <p:txBody>
+            <a:bodyPr wrap="square" rtlCol="0">
+              <a:spAutoFit/>
+            </a:bodyPr>
+            <a:lstStyle/>
+            <a:p>
+              <a:r>
+                <a:rPr lang="en-US" altLang="zh-CN" sz="1400" dirty="0" err="1" smtClean="0"/>
+                <a:t>educationExp</a:t>
+              </a:r>
+              <a:endParaRPr lang="en-US" sz="1400" dirty="0"/>
+            </a:p>
+          </p:txBody>
+        </p:sp>
+        <p:sp>
+          <p:nvSpPr>
+            <p:cNvPr id="116" name="TextBox 115"/>
+            <p:cNvSpPr txBox="1"/>
+            <p:nvPr/>
+          </p:nvSpPr>
+          <p:spPr>
+            <a:xfrm>
+              <a:off x="614659" y="1001667"/>
+              <a:ext cx="1065208" cy="1077218"/>
+            </a:xfrm>
+            <a:prstGeom prst="rect">
+              <a:avLst/>
+            </a:prstGeom>
+            <a:noFill/>
+          </p:spPr>
+          <p:txBody>
+            <a:bodyPr wrap="square" rtlCol="0">
+              <a:spAutoFit/>
+            </a:bodyPr>
+            <a:lstStyle/>
+            <a:p>
+              <a:r>
+                <a:rPr lang="en-US" altLang="zh-CN" sz="800" dirty="0" smtClean="0"/>
+                <a:t>ID:</a:t>
+              </a:r>
+            </a:p>
+            <a:p>
+              <a:r>
+                <a:rPr lang="en-US" altLang="zh-CN" sz="800" dirty="0" smtClean="0"/>
+                <a:t>institution:</a:t>
+              </a:r>
+            </a:p>
+            <a:p>
+              <a:r>
+                <a:rPr lang="en-US" altLang="zh-CN" sz="800" dirty="0" smtClean="0"/>
+                <a:t>major:</a:t>
+              </a:r>
+            </a:p>
+            <a:p>
+              <a:endParaRPr lang="en-US" altLang="zh-CN" sz="800" dirty="0"/>
+            </a:p>
+            <a:p>
+              <a:endParaRPr lang="en-US" altLang="zh-CN" sz="800" dirty="0" smtClean="0"/>
+            </a:p>
+            <a:p>
+              <a:r>
+                <a:rPr lang="en-US" altLang="zh-CN" sz="800" dirty="0" smtClean="0"/>
+                <a:t>(education</a:t>
+              </a:r>
+              <a:r>
+                <a:rPr lang="zh-CN" altLang="en-US" sz="800" dirty="0" smtClean="0"/>
+                <a:t> </a:t>
+              </a:r>
+              <a:r>
+                <a:rPr lang="en-US" altLang="zh-CN" sz="800" dirty="0" smtClean="0"/>
+                <a:t>experience)</a:t>
+              </a:r>
+            </a:p>
+            <a:p>
+              <a:endParaRPr lang="en-US" altLang="zh-CN" sz="800" dirty="0" smtClean="0"/>
+            </a:p>
+          </p:txBody>
+        </p:sp>
+      </p:grpSp>
+      <p:grpSp>
+        <p:nvGrpSpPr>
+          <p:cNvPr id="117" name="Group 116"/>
+          <p:cNvGrpSpPr/>
+          <p:nvPr/>
+        </p:nvGrpSpPr>
+        <p:grpSpPr>
+          <a:xfrm>
+            <a:off x="1814513" y="1364457"/>
+            <a:ext cx="2382945" cy="3954287"/>
+            <a:chOff x="-3880524" y="85987"/>
+            <a:chExt cx="2382945" cy="3954287"/>
+          </a:xfrm>
+        </p:grpSpPr>
+        <p:cxnSp>
+          <p:nvCxnSpPr>
+            <p:cNvPr id="118" name="Curved Connector 117"/>
+            <p:cNvCxnSpPr>
+              <a:stCxn id="4" idx="3"/>
+              <a:endCxn id="115" idx="1"/>
+            </p:cNvCxnSpPr>
+            <p:nvPr/>
+          </p:nvCxnSpPr>
+          <p:spPr>
+            <a:xfrm>
+              <a:off x="-3880524" y="85987"/>
+              <a:ext cx="1549375" cy="3791072"/>
+            </a:xfrm>
+            <a:prstGeom prst="curvedConnector3">
+              <a:avLst>
+                <a:gd name="adj1" fmla="val 50000"/>
+              </a:avLst>
+            </a:prstGeom>
+            <a:ln>
+              <a:headEnd type="triangle"/>
+              <a:tailEnd type="triangle"/>
+            </a:ln>
+          </p:spPr>
+          <p:style>
+            <a:lnRef idx="1">
+              <a:schemeClr val="accent1"/>
+            </a:lnRef>
+            <a:fillRef idx="0">
+              <a:schemeClr val="accent1"/>
+            </a:fillRef>
+            <a:effectRef idx="0">
+              <a:schemeClr val="accent1"/>
+            </a:effectRef>
+            <a:fontRef idx="minor">
+              <a:schemeClr val="tx1"/>
+            </a:fontRef>
+          </p:style>
+        </p:cxnSp>
+        <p:sp>
+          <p:nvSpPr>
+            <p:cNvPr id="119" name="TextBox 118"/>
+            <p:cNvSpPr txBox="1"/>
+            <p:nvPr/>
+          </p:nvSpPr>
+          <p:spPr>
+            <a:xfrm>
+              <a:off x="-2538761" y="3116944"/>
+              <a:ext cx="1041182" cy="923330"/>
+            </a:xfrm>
+            <a:prstGeom prst="rect">
+              <a:avLst/>
+            </a:prstGeom>
+            <a:noFill/>
+          </p:spPr>
+          <p:txBody>
+            <a:bodyPr wrap="none" rtlCol="0">
+              <a:spAutoFit/>
+            </a:bodyPr>
+            <a:lstStyle/>
+            <a:p>
+              <a:r>
+                <a:rPr lang="en-US" altLang="zh-CN" dirty="0" err="1" smtClean="0"/>
+                <a:t>hasMany</a:t>
+              </a:r>
+              <a:endParaRPr lang="en-US" altLang="zh-CN" dirty="0" smtClean="0"/>
+            </a:p>
+            <a:p>
+              <a:r>
+                <a:rPr lang="en-US" altLang="zh-CN" dirty="0" err="1" smtClean="0"/>
+                <a:t>hasMany</a:t>
+              </a:r>
+              <a:endParaRPr lang="en-US" altLang="zh-CN" dirty="0" smtClean="0"/>
+            </a:p>
+            <a:p>
+              <a:endParaRPr lang="en-US" dirty="0"/>
+            </a:p>
+          </p:txBody>
+        </p:sp>
+      </p:grpSp>
+      <p:grpSp>
+        <p:nvGrpSpPr>
+          <p:cNvPr id="120" name="Group 119"/>
+          <p:cNvGrpSpPr/>
+          <p:nvPr/>
+        </p:nvGrpSpPr>
+        <p:grpSpPr>
+          <a:xfrm>
+            <a:off x="1814513" y="931264"/>
+            <a:ext cx="1880110" cy="729705"/>
+            <a:chOff x="-1718666" y="2169970"/>
+            <a:chExt cx="1880110" cy="729705"/>
+          </a:xfrm>
+        </p:grpSpPr>
+        <p:cxnSp>
+          <p:nvCxnSpPr>
+            <p:cNvPr id="121" name="Curved Connector 120"/>
+            <p:cNvCxnSpPr>
+              <a:stCxn id="42" idx="1"/>
+              <a:endCxn id="4" idx="3"/>
+            </p:cNvCxnSpPr>
+            <p:nvPr/>
+          </p:nvCxnSpPr>
+          <p:spPr>
+            <a:xfrm rot="10800000">
+              <a:off x="-1718666" y="2603163"/>
+              <a:ext cx="1880110" cy="296512"/>
+            </a:xfrm>
+            <a:prstGeom prst="curvedConnector3">
+              <a:avLst>
+                <a:gd name="adj1" fmla="val 50000"/>
+              </a:avLst>
+            </a:prstGeom>
+            <a:ln>
+              <a:headEnd type="triangle"/>
+              <a:tailEnd type="triangle"/>
+            </a:ln>
+          </p:spPr>
+          <p:style>
+            <a:lnRef idx="1">
+              <a:schemeClr val="accent1"/>
+            </a:lnRef>
+            <a:fillRef idx="0">
+              <a:schemeClr val="accent1"/>
+            </a:fillRef>
+            <a:effectRef idx="0">
+              <a:schemeClr val="accent1"/>
+            </a:effectRef>
+            <a:fontRef idx="minor">
+              <a:schemeClr val="tx1"/>
+            </a:fontRef>
+          </p:style>
+        </p:cxnSp>
+        <p:sp>
+          <p:nvSpPr>
+            <p:cNvPr id="122" name="TextBox 121"/>
+            <p:cNvSpPr txBox="1"/>
+            <p:nvPr/>
+          </p:nvSpPr>
+          <p:spPr>
+            <a:xfrm>
+              <a:off x="-1272603" y="2169970"/>
+              <a:ext cx="1036502" cy="646331"/>
+            </a:xfrm>
+            <a:prstGeom prst="rect">
+              <a:avLst/>
+            </a:prstGeom>
+            <a:noFill/>
+          </p:spPr>
+          <p:txBody>
+            <a:bodyPr wrap="none" rtlCol="0">
+              <a:spAutoFit/>
+            </a:bodyPr>
+            <a:lstStyle/>
+            <a:p>
+              <a:r>
+                <a:rPr lang="en-US" altLang="zh-CN" dirty="0" err="1" smtClean="0"/>
+                <a:t>hasMany</a:t>
+              </a:r>
+              <a:endParaRPr lang="en-US" altLang="zh-CN" dirty="0" smtClean="0"/>
+            </a:p>
+            <a:p>
+              <a:r>
+                <a:rPr lang="en-US" altLang="zh-CN" dirty="0" err="1" smtClean="0"/>
+                <a:t>belongTo</a:t>
+              </a:r>
+              <a:endParaRPr lang="en-US" dirty="0"/>
+            </a:p>
+          </p:txBody>
+        </p:sp>
+      </p:grpSp>
+      <p:grpSp>
+        <p:nvGrpSpPr>
+          <p:cNvPr id="123" name="Group 122"/>
+          <p:cNvGrpSpPr/>
+          <p:nvPr/>
+        </p:nvGrpSpPr>
+        <p:grpSpPr>
+          <a:xfrm flipH="1">
+            <a:off x="2664439" y="1660968"/>
+            <a:ext cx="1079457" cy="1902839"/>
+            <a:chOff x="-455801" y="1980227"/>
+            <a:chExt cx="3225344" cy="879187"/>
+          </a:xfrm>
+        </p:grpSpPr>
+        <p:cxnSp>
+          <p:nvCxnSpPr>
+            <p:cNvPr id="124" name="Curved Connector 123"/>
+            <p:cNvCxnSpPr>
+              <a:stCxn id="17" idx="1"/>
+              <a:endCxn id="42" idx="1"/>
+            </p:cNvCxnSpPr>
+            <p:nvPr/>
+          </p:nvCxnSpPr>
+          <p:spPr>
+            <a:xfrm rot="10800000" flipH="1">
+              <a:off x="-316614" y="1980227"/>
+              <a:ext cx="8038" cy="879187"/>
+            </a:xfrm>
+            <a:prstGeom prst="curvedConnector3">
+              <a:avLst>
+                <a:gd name="adj1" fmla="val 8598141"/>
+              </a:avLst>
+            </a:prstGeom>
+            <a:ln>
+              <a:headEnd type="triangle"/>
+              <a:tailEnd type="triangle"/>
+            </a:ln>
+          </p:spPr>
+          <p:style>
+            <a:lnRef idx="1">
+              <a:schemeClr val="accent1"/>
+            </a:lnRef>
+            <a:fillRef idx="0">
+              <a:schemeClr val="accent1"/>
+            </a:fillRef>
+            <a:effectRef idx="0">
+              <a:schemeClr val="accent1"/>
+            </a:effectRef>
+            <a:fontRef idx="minor">
+              <a:schemeClr val="tx1"/>
+            </a:fontRef>
+          </p:style>
+        </p:cxnSp>
+        <p:sp>
+          <p:nvSpPr>
+            <p:cNvPr id="125" name="TextBox 124"/>
+            <p:cNvSpPr txBox="1"/>
+            <p:nvPr/>
+          </p:nvSpPr>
+          <p:spPr>
+            <a:xfrm>
+              <a:off x="-455801" y="2289789"/>
+              <a:ext cx="3225344" cy="298630"/>
+            </a:xfrm>
+            <a:prstGeom prst="rect">
+              <a:avLst/>
+            </a:prstGeom>
+            <a:noFill/>
+          </p:spPr>
+          <p:txBody>
+            <a:bodyPr wrap="square" rtlCol="0">
+              <a:spAutoFit/>
+            </a:bodyPr>
+            <a:lstStyle/>
+            <a:p>
+              <a:r>
+                <a:rPr lang="en-US" altLang="zh-CN" dirty="0" err="1" smtClean="0"/>
+                <a:t>hasMany</a:t>
+              </a:r>
+              <a:endParaRPr lang="en-US" altLang="zh-CN" dirty="0" smtClean="0"/>
+            </a:p>
+            <a:p>
+              <a:r>
+                <a:rPr lang="en-US" altLang="zh-CN" dirty="0" err="1" smtClean="0"/>
+                <a:t>belongTo</a:t>
+              </a:r>
+              <a:endParaRPr lang="en-US" dirty="0"/>
+            </a:p>
+          </p:txBody>
+        </p:sp>
+      </p:grpSp>
+      <p:grpSp>
+        <p:nvGrpSpPr>
+          <p:cNvPr id="126" name="Group 125"/>
+          <p:cNvGrpSpPr/>
+          <p:nvPr/>
+        </p:nvGrpSpPr>
+        <p:grpSpPr>
+          <a:xfrm flipH="1">
+            <a:off x="4816582" y="3111760"/>
+            <a:ext cx="1079457" cy="646330"/>
+            <a:chOff x="-1874047" y="2648463"/>
+            <a:chExt cx="3225344" cy="298630"/>
+          </a:xfrm>
+        </p:grpSpPr>
+        <p:cxnSp>
+          <p:nvCxnSpPr>
+            <p:cNvPr id="127" name="Curved Connector 126"/>
+            <p:cNvCxnSpPr>
+              <a:stCxn id="17" idx="3"/>
+              <a:endCxn id="22" idx="1"/>
+            </p:cNvCxnSpPr>
+            <p:nvPr/>
+          </p:nvCxnSpPr>
+          <p:spPr>
+            <a:xfrm flipH="1" flipV="1">
+              <a:off x="-1708088" y="2742567"/>
+              <a:ext cx="2732338" cy="114760"/>
+            </a:xfrm>
+            <a:prstGeom prst="curvedConnector3">
+              <a:avLst>
+                <a:gd name="adj1" fmla="val 50000"/>
+              </a:avLst>
+            </a:prstGeom>
+            <a:ln>
+              <a:headEnd type="triangle"/>
+              <a:tailEnd type="triangle"/>
+            </a:ln>
+          </p:spPr>
+          <p:style>
+            <a:lnRef idx="1">
+              <a:schemeClr val="accent1"/>
+            </a:lnRef>
+            <a:fillRef idx="0">
+              <a:schemeClr val="accent1"/>
+            </a:fillRef>
+            <a:effectRef idx="0">
+              <a:schemeClr val="accent1"/>
+            </a:effectRef>
+            <a:fontRef idx="minor">
+              <a:schemeClr val="tx1"/>
+            </a:fontRef>
+          </p:style>
+        </p:cxnSp>
+        <p:sp>
+          <p:nvSpPr>
+            <p:cNvPr id="128" name="TextBox 127"/>
+            <p:cNvSpPr txBox="1"/>
+            <p:nvPr/>
+          </p:nvSpPr>
+          <p:spPr>
+            <a:xfrm>
+              <a:off x="-1874047" y="2648463"/>
+              <a:ext cx="3225344" cy="298630"/>
+            </a:xfrm>
+            <a:prstGeom prst="rect">
+              <a:avLst/>
+            </a:prstGeom>
+            <a:noFill/>
+          </p:spPr>
+          <p:txBody>
+            <a:bodyPr wrap="square" rtlCol="0">
+              <a:spAutoFit/>
+            </a:bodyPr>
+            <a:lstStyle/>
+            <a:p>
+              <a:r>
+                <a:rPr lang="en-US" altLang="zh-CN" dirty="0" err="1" smtClean="0"/>
+                <a:t>hasMany</a:t>
+              </a:r>
+              <a:endParaRPr lang="en-US" altLang="zh-CN" dirty="0" smtClean="0"/>
+            </a:p>
+            <a:p>
+              <a:r>
+                <a:rPr lang="en-US" altLang="zh-CN" dirty="0" err="1" smtClean="0"/>
+                <a:t>belongTo</a:t>
+              </a:r>
+              <a:endParaRPr lang="en-US" dirty="0"/>
+            </a:p>
+          </p:txBody>
+        </p:sp>
+      </p:grpSp>
+      <p:grpSp>
+        <p:nvGrpSpPr>
+          <p:cNvPr id="132" name="Group 131"/>
+          <p:cNvGrpSpPr/>
+          <p:nvPr/>
+        </p:nvGrpSpPr>
+        <p:grpSpPr>
+          <a:xfrm flipH="1">
+            <a:off x="4308986" y="2211965"/>
+            <a:ext cx="1701621" cy="1222962"/>
+            <a:chOff x="-725511" y="2903614"/>
+            <a:chExt cx="3088148" cy="384089"/>
+          </a:xfrm>
+        </p:grpSpPr>
+        <p:cxnSp>
+          <p:nvCxnSpPr>
+            <p:cNvPr id="133" name="Curved Connector 132"/>
+            <p:cNvCxnSpPr>
+              <a:stCxn id="42" idx="2"/>
+              <a:endCxn id="128" idx="1"/>
+            </p:cNvCxnSpPr>
+            <p:nvPr/>
+          </p:nvCxnSpPr>
+          <p:spPr>
+            <a:xfrm rot="5400000">
+              <a:off x="759501" y="1684566"/>
+              <a:ext cx="326046" cy="2880227"/>
+            </a:xfrm>
+            <a:prstGeom prst="curvedConnector4">
+              <a:avLst>
+                <a:gd name="adj1" fmla="val 34435"/>
+                <a:gd name="adj2" fmla="val 114404"/>
+              </a:avLst>
+            </a:prstGeom>
+            <a:ln>
+              <a:headEnd type="triangle"/>
+              <a:tailEnd type="triangle"/>
+            </a:ln>
+          </p:spPr>
+          <p:style>
+            <a:lnRef idx="1">
+              <a:schemeClr val="accent1"/>
+            </a:lnRef>
+            <a:fillRef idx="0">
+              <a:schemeClr val="accent1"/>
+            </a:fillRef>
+            <a:effectRef idx="0">
+              <a:schemeClr val="accent1"/>
+            </a:effectRef>
+            <a:fontRef idx="minor">
+              <a:schemeClr val="tx1"/>
+            </a:fontRef>
+          </p:style>
+        </p:cxnSp>
+        <p:sp>
+          <p:nvSpPr>
+            <p:cNvPr id="134" name="TextBox 133"/>
+            <p:cNvSpPr txBox="1"/>
+            <p:nvPr/>
+          </p:nvSpPr>
+          <p:spPr>
+            <a:xfrm>
+              <a:off x="-725511" y="2903614"/>
+              <a:ext cx="2594219" cy="202990"/>
+            </a:xfrm>
+            <a:prstGeom prst="rect">
+              <a:avLst/>
+            </a:prstGeom>
+            <a:noFill/>
+          </p:spPr>
+          <p:txBody>
+            <a:bodyPr wrap="square" rtlCol="0">
+              <a:spAutoFit/>
+            </a:bodyPr>
+            <a:lstStyle/>
+            <a:p>
+              <a:r>
+                <a:rPr lang="en-US" altLang="zh-CN" dirty="0" err="1" smtClean="0"/>
+                <a:t>hasMany</a:t>
+              </a:r>
+              <a:endParaRPr lang="en-US" altLang="zh-CN" dirty="0" smtClean="0"/>
+            </a:p>
+            <a:p>
+              <a:r>
+                <a:rPr lang="en-US" altLang="zh-CN" dirty="0" err="1" smtClean="0"/>
+                <a:t>belongTo</a:t>
+              </a:r>
+              <a:endParaRPr lang="en-US" dirty="0"/>
+            </a:p>
+          </p:txBody>
+        </p:sp>
+      </p:grpSp>
+      <p:grpSp>
+        <p:nvGrpSpPr>
+          <p:cNvPr id="138" name="Group 137"/>
+          <p:cNvGrpSpPr/>
+          <p:nvPr/>
+        </p:nvGrpSpPr>
+        <p:grpSpPr>
+          <a:xfrm flipH="1">
+            <a:off x="4923348" y="1185519"/>
+            <a:ext cx="1120691" cy="646331"/>
+            <a:chOff x="-130537" y="2621150"/>
+            <a:chExt cx="1905943" cy="189539"/>
+          </a:xfrm>
+        </p:grpSpPr>
+        <p:cxnSp>
+          <p:nvCxnSpPr>
+            <p:cNvPr id="139" name="Curved Connector 138"/>
+            <p:cNvCxnSpPr>
+              <a:stCxn id="42" idx="3"/>
+              <a:endCxn id="27" idx="1"/>
+            </p:cNvCxnSpPr>
+            <p:nvPr/>
+          </p:nvCxnSpPr>
+          <p:spPr>
+            <a:xfrm flipH="1" flipV="1">
+              <a:off x="380461" y="2624111"/>
+              <a:ext cx="1394945" cy="136466"/>
+            </a:xfrm>
+            <a:prstGeom prst="curvedConnector3">
+              <a:avLst>
+                <a:gd name="adj1" fmla="val 50000"/>
+              </a:avLst>
+            </a:prstGeom>
+            <a:ln>
+              <a:headEnd type="triangle"/>
+              <a:tailEnd type="triangle"/>
+            </a:ln>
+          </p:spPr>
+          <p:style>
+            <a:lnRef idx="1">
+              <a:schemeClr val="accent1"/>
+            </a:lnRef>
+            <a:fillRef idx="0">
+              <a:schemeClr val="accent1"/>
+            </a:fillRef>
+            <a:effectRef idx="0">
+              <a:schemeClr val="accent1"/>
+            </a:effectRef>
+            <a:fontRef idx="minor">
+              <a:schemeClr val="tx1"/>
+            </a:fontRef>
+          </p:style>
+        </p:cxnSp>
+        <p:sp>
+          <p:nvSpPr>
+            <p:cNvPr id="140" name="TextBox 139"/>
+            <p:cNvSpPr txBox="1"/>
+            <p:nvPr/>
+          </p:nvSpPr>
+          <p:spPr>
+            <a:xfrm>
+              <a:off x="-130537" y="2621150"/>
+              <a:ext cx="1764097" cy="189539"/>
+            </a:xfrm>
+            <a:prstGeom prst="rect">
+              <a:avLst/>
+            </a:prstGeom>
+            <a:noFill/>
+          </p:spPr>
+          <p:txBody>
+            <a:bodyPr wrap="square" rtlCol="0">
+              <a:spAutoFit/>
+            </a:bodyPr>
+            <a:lstStyle/>
+            <a:p>
+              <a:r>
+                <a:rPr lang="en-US" altLang="zh-CN" dirty="0" err="1" smtClean="0"/>
+                <a:t>hasMany</a:t>
+              </a:r>
+              <a:endParaRPr lang="en-US" altLang="zh-CN" dirty="0" smtClean="0"/>
+            </a:p>
+            <a:p>
+              <a:r>
+                <a:rPr lang="en-US" altLang="zh-CN" dirty="0" err="1" smtClean="0"/>
+                <a:t>hasMany</a:t>
+              </a:r>
+              <a:endParaRPr lang="en-US" dirty="0"/>
+            </a:p>
+          </p:txBody>
+        </p:sp>
+      </p:grpSp>
+      <p:grpSp>
+        <p:nvGrpSpPr>
+          <p:cNvPr id="129" name="Group 128"/>
+          <p:cNvGrpSpPr/>
+          <p:nvPr/>
+        </p:nvGrpSpPr>
+        <p:grpSpPr>
+          <a:xfrm>
+            <a:off x="1198699" y="-44305"/>
+            <a:ext cx="3108835" cy="969467"/>
+            <a:chOff x="-2701914" y="2169970"/>
+            <a:chExt cx="3108835" cy="969467"/>
+          </a:xfrm>
+        </p:grpSpPr>
+        <p:cxnSp>
+          <p:nvCxnSpPr>
+            <p:cNvPr id="130" name="Curved Connector 129"/>
+            <p:cNvCxnSpPr>
+              <a:stCxn id="44" idx="0"/>
+              <a:endCxn id="8" idx="0"/>
+            </p:cNvCxnSpPr>
+            <p:nvPr/>
+          </p:nvCxnSpPr>
+          <p:spPr>
+            <a:xfrm rot="16200000" flipV="1">
+              <a:off x="-1295752" y="1436763"/>
+              <a:ext cx="296512" cy="3108835"/>
+            </a:xfrm>
+            <a:prstGeom prst="curvedConnector3">
+              <a:avLst>
+                <a:gd name="adj1" fmla="val 177096"/>
+              </a:avLst>
+            </a:prstGeom>
+            <a:ln>
+              <a:headEnd type="triangle"/>
+              <a:tailEnd type="triangle"/>
+            </a:ln>
+          </p:spPr>
+          <p:style>
+            <a:lnRef idx="1">
+              <a:schemeClr val="accent1"/>
+            </a:lnRef>
+            <a:fillRef idx="0">
+              <a:schemeClr val="accent1"/>
+            </a:fillRef>
+            <a:effectRef idx="0">
+              <a:schemeClr val="accent1"/>
+            </a:effectRef>
+            <a:fontRef idx="minor">
+              <a:schemeClr val="tx1"/>
+            </a:fontRef>
+          </p:style>
+        </p:cxnSp>
+        <p:sp>
+          <p:nvSpPr>
+            <p:cNvPr id="131" name="TextBox 130"/>
+            <p:cNvSpPr txBox="1"/>
+            <p:nvPr/>
+          </p:nvSpPr>
+          <p:spPr>
+            <a:xfrm>
+              <a:off x="-1272603" y="2169970"/>
+              <a:ext cx="1098827" cy="923330"/>
+            </a:xfrm>
+            <a:prstGeom prst="rect">
+              <a:avLst/>
+            </a:prstGeom>
+            <a:noFill/>
+          </p:spPr>
+          <p:txBody>
+            <a:bodyPr wrap="none" rtlCol="0">
+              <a:spAutoFit/>
+            </a:bodyPr>
+            <a:lstStyle/>
+            <a:p>
+              <a:r>
+                <a:rPr lang="en-US" altLang="zh-CN" dirty="0" err="1" smtClean="0"/>
+                <a:t>hasMany</a:t>
+              </a:r>
+              <a:endParaRPr lang="en-US" altLang="zh-CN" dirty="0" smtClean="0"/>
+            </a:p>
+            <a:p>
+              <a:r>
+                <a:rPr lang="en-US" altLang="zh-CN" dirty="0" err="1" smtClean="0"/>
+                <a:t>hasMany</a:t>
+              </a:r>
+              <a:endParaRPr lang="en-US" altLang="zh-CN" dirty="0" smtClean="0"/>
+            </a:p>
+            <a:p>
+              <a:r>
+                <a:rPr lang="en-US" altLang="zh-CN" dirty="0" smtClean="0"/>
+                <a:t>(</a:t>
+              </a:r>
+              <a:r>
+                <a:rPr lang="en-US" altLang="zh-CN" dirty="0" err="1" smtClean="0"/>
+                <a:t>vote_up</a:t>
+              </a:r>
+              <a:r>
+                <a:rPr lang="en-US" altLang="zh-CN" dirty="0" smtClean="0"/>
+                <a:t>)</a:t>
+              </a:r>
+              <a:endParaRPr lang="en-US" dirty="0"/>
+            </a:p>
+          </p:txBody>
+        </p:sp>
+      </p:grpSp>
+      <p:grpSp>
+        <p:nvGrpSpPr>
+          <p:cNvPr id="135" name="Group 134"/>
+          <p:cNvGrpSpPr/>
+          <p:nvPr/>
+        </p:nvGrpSpPr>
+        <p:grpSpPr>
+          <a:xfrm>
+            <a:off x="582885" y="90341"/>
+            <a:ext cx="3726102" cy="923330"/>
+            <a:chOff x="-3470128" y="2152216"/>
+            <a:chExt cx="3726102" cy="923330"/>
+          </a:xfrm>
+        </p:grpSpPr>
+        <p:cxnSp>
+          <p:nvCxnSpPr>
+            <p:cNvPr id="136" name="Curved Connector 135"/>
+            <p:cNvCxnSpPr>
+              <a:stCxn id="42" idx="0"/>
+              <a:endCxn id="8" idx="1"/>
+            </p:cNvCxnSpPr>
+            <p:nvPr/>
+          </p:nvCxnSpPr>
+          <p:spPr>
+            <a:xfrm rot="16200000" flipV="1">
+              <a:off x="-1678389" y="1052675"/>
+              <a:ext cx="142623" cy="3726102"/>
+            </a:xfrm>
+            <a:prstGeom prst="curvedConnector4">
+              <a:avLst>
+                <a:gd name="adj1" fmla="val 368182"/>
+                <a:gd name="adj2" fmla="val 106135"/>
+              </a:avLst>
+            </a:prstGeom>
+            <a:ln>
+              <a:headEnd type="triangle"/>
+              <a:tailEnd type="triangle"/>
+            </a:ln>
+          </p:spPr>
+          <p:style>
+            <a:lnRef idx="1">
+              <a:schemeClr val="accent1"/>
+            </a:lnRef>
+            <a:fillRef idx="0">
+              <a:schemeClr val="accent1"/>
+            </a:fillRef>
+            <a:effectRef idx="0">
+              <a:schemeClr val="accent1"/>
+            </a:effectRef>
+            <a:fontRef idx="minor">
+              <a:schemeClr val="tx1"/>
+            </a:fontRef>
+          </p:style>
+        </p:cxnSp>
+        <p:sp>
+          <p:nvSpPr>
+            <p:cNvPr id="137" name="TextBox 136"/>
+            <p:cNvSpPr txBox="1"/>
+            <p:nvPr/>
+          </p:nvSpPr>
+          <p:spPr>
+            <a:xfrm>
+              <a:off x="-2916074" y="2152216"/>
+              <a:ext cx="1385059" cy="923330"/>
+            </a:xfrm>
+            <a:prstGeom prst="rect">
+              <a:avLst/>
+            </a:prstGeom>
+            <a:noFill/>
+          </p:spPr>
+          <p:txBody>
+            <a:bodyPr wrap="none" rtlCol="0">
+              <a:spAutoFit/>
+            </a:bodyPr>
+            <a:lstStyle/>
+            <a:p>
+              <a:r>
+                <a:rPr lang="en-US" altLang="zh-CN" dirty="0" err="1" smtClean="0"/>
+                <a:t>hasMany</a:t>
+              </a:r>
+              <a:endParaRPr lang="en-US" altLang="zh-CN" dirty="0" smtClean="0"/>
+            </a:p>
+            <a:p>
+              <a:r>
+                <a:rPr lang="en-US" altLang="zh-CN" dirty="0" err="1" smtClean="0"/>
+                <a:t>hasMany</a:t>
+              </a:r>
+              <a:endParaRPr lang="en-US" altLang="zh-CN" dirty="0" smtClean="0"/>
+            </a:p>
+            <a:p>
+              <a:r>
+                <a:rPr lang="en-US" altLang="zh-CN" dirty="0" smtClean="0"/>
+                <a:t>(</a:t>
+              </a:r>
+              <a:r>
+                <a:rPr lang="en-US" altLang="zh-CN" dirty="0" err="1" smtClean="0"/>
+                <a:t>vote_down</a:t>
+              </a:r>
+              <a:r>
+                <a:rPr lang="en-US" altLang="zh-CN" dirty="0" smtClean="0"/>
+                <a:t>)</a:t>
+              </a:r>
+              <a:endParaRPr lang="en-US" dirty="0"/>
             </a:p>
           </p:txBody>
         </p:sp>

</xml_diff>

<commit_message>
optimize topic subtopic database structure
1. user now can view specific topic
</commit_message>
<xml_diff>
--- a/database_structure.pptx
+++ b/database_structure.pptx
@@ -7274,6 +7274,246 @@
           </p:txBody>
         </p:sp>
       </p:grpSp>
+      <p:grpSp>
+        <p:nvGrpSpPr>
+          <p:cNvPr id="147" name="Group 146"/>
+          <p:cNvGrpSpPr/>
+          <p:nvPr/>
+        </p:nvGrpSpPr>
+        <p:grpSpPr>
+          <a:xfrm flipH="1">
+            <a:off x="6318260" y="3315426"/>
+            <a:ext cx="1970979" cy="1107657"/>
+            <a:chOff x="59093" y="3257065"/>
+            <a:chExt cx="3576987" cy="347876"/>
+          </a:xfrm>
+        </p:grpSpPr>
+        <p:cxnSp>
+          <p:nvCxnSpPr>
+            <p:cNvPr id="148" name="Curved Connector 147"/>
+            <p:cNvCxnSpPr>
+              <a:stCxn id="22" idx="3"/>
+              <a:endCxn id="22" idx="2"/>
+            </p:cNvCxnSpPr>
+            <p:nvPr/>
+          </p:nvCxnSpPr>
+          <p:spPr>
+            <a:xfrm>
+              <a:off x="2273215" y="3257065"/>
+              <a:ext cx="1114961" cy="231091"/>
+            </a:xfrm>
+            <a:prstGeom prst="curvedConnector4">
+              <a:avLst>
+                <a:gd name="adj1" fmla="val -37209"/>
+                <a:gd name="adj2" fmla="val 131068"/>
+              </a:avLst>
+            </a:prstGeom>
+            <a:ln>
+              <a:headEnd type="triangle"/>
+              <a:tailEnd type="triangle"/>
+            </a:ln>
+          </p:spPr>
+          <p:style>
+            <a:lnRef idx="1">
+              <a:schemeClr val="accent1"/>
+            </a:lnRef>
+            <a:fillRef idx="0">
+              <a:schemeClr val="accent1"/>
+            </a:fillRef>
+            <a:effectRef idx="0">
+              <a:schemeClr val="accent1"/>
+            </a:effectRef>
+            <a:fontRef idx="minor">
+              <a:schemeClr val="tx1"/>
+            </a:fontRef>
+          </p:style>
+        </p:cxnSp>
+        <p:sp>
+          <p:nvSpPr>
+            <p:cNvPr id="149" name="TextBox 148"/>
+            <p:cNvSpPr txBox="1"/>
+            <p:nvPr/>
+          </p:nvSpPr>
+          <p:spPr>
+            <a:xfrm>
+              <a:off x="59093" y="3314956"/>
+              <a:ext cx="3576987" cy="289985"/>
+            </a:xfrm>
+            <a:prstGeom prst="rect">
+              <a:avLst/>
+            </a:prstGeom>
+            <a:noFill/>
+          </p:spPr>
+          <p:txBody>
+            <a:bodyPr wrap="square" rtlCol="0">
+              <a:spAutoFit/>
+            </a:bodyPr>
+            <a:lstStyle/>
+            <a:p>
+              <a:r>
+                <a:rPr lang="en-US" altLang="zh-CN" dirty="0" err="1" smtClean="0"/>
+                <a:t>hasMany</a:t>
+              </a:r>
+              <a:r>
+                <a:rPr lang="zh-CN" altLang="en-US" dirty="0" smtClean="0"/>
+                <a:t> </a:t>
+              </a:r>
+              <a:r>
+                <a:rPr lang="en-US" altLang="zh-CN" dirty="0" smtClean="0"/>
+                <a:t>(</a:t>
+              </a:r>
+              <a:r>
+                <a:rPr lang="en-US" altLang="zh-CN" dirty="0" err="1" smtClean="0"/>
+                <a:t>receive_replies</a:t>
+              </a:r>
+              <a:r>
+                <a:rPr lang="en-US" altLang="zh-CN" dirty="0" smtClean="0"/>
+                <a:t>)</a:t>
+              </a:r>
+              <a:endParaRPr lang="en-US" altLang="zh-CN" dirty="0" smtClean="0"/>
+            </a:p>
+            <a:p>
+              <a:r>
+                <a:rPr lang="en-US" altLang="zh-CN" dirty="0" err="1" smtClean="0"/>
+                <a:t>belongTo</a:t>
+              </a:r>
+              <a:r>
+                <a:rPr lang="zh-CN" altLang="en-US" dirty="0" smtClean="0"/>
+                <a:t> </a:t>
+              </a:r>
+              <a:r>
+                <a:rPr lang="en-US" altLang="zh-CN" dirty="0" smtClean="0"/>
+                <a:t>(</a:t>
+              </a:r>
+              <a:r>
+                <a:rPr lang="en-US" altLang="zh-CN" dirty="0" err="1" smtClean="0"/>
+                <a:t>reply_to</a:t>
+              </a:r>
+              <a:r>
+                <a:rPr lang="en-US" altLang="zh-CN" dirty="0" smtClean="0"/>
+                <a:t>)</a:t>
+              </a:r>
+              <a:endParaRPr lang="en-US" dirty="0"/>
+            </a:p>
+          </p:txBody>
+        </p:sp>
+      </p:grpSp>
+      <p:grpSp>
+        <p:nvGrpSpPr>
+          <p:cNvPr id="150" name="Group 149"/>
+          <p:cNvGrpSpPr/>
+          <p:nvPr/>
+        </p:nvGrpSpPr>
+        <p:grpSpPr>
+          <a:xfrm flipH="1">
+            <a:off x="6357936" y="1195621"/>
+            <a:ext cx="2106178" cy="1207990"/>
+            <a:chOff x="236347" y="3158275"/>
+            <a:chExt cx="3822350" cy="379387"/>
+          </a:xfrm>
+        </p:grpSpPr>
+        <p:cxnSp>
+          <p:nvCxnSpPr>
+            <p:cNvPr id="151" name="Curved Connector 150"/>
+            <p:cNvCxnSpPr>
+              <a:stCxn id="27" idx="3"/>
+              <a:endCxn id="27" idx="2"/>
+            </p:cNvCxnSpPr>
+            <p:nvPr/>
+          </p:nvCxnSpPr>
+          <p:spPr>
+            <a:xfrm>
+              <a:off x="2943736" y="3158275"/>
+              <a:ext cx="1114961" cy="231091"/>
+            </a:xfrm>
+            <a:prstGeom prst="curvedConnector4">
+              <a:avLst>
+                <a:gd name="adj1" fmla="val -37209"/>
+                <a:gd name="adj2" fmla="val 131068"/>
+              </a:avLst>
+            </a:prstGeom>
+            <a:ln>
+              <a:headEnd type="triangle"/>
+              <a:tailEnd type="triangle"/>
+            </a:ln>
+          </p:spPr>
+          <p:style>
+            <a:lnRef idx="1">
+              <a:schemeClr val="accent1"/>
+            </a:lnRef>
+            <a:fillRef idx="0">
+              <a:schemeClr val="accent1"/>
+            </a:fillRef>
+            <a:effectRef idx="0">
+              <a:schemeClr val="accent1"/>
+            </a:effectRef>
+            <a:fontRef idx="minor">
+              <a:schemeClr val="tx1"/>
+            </a:fontRef>
+          </p:style>
+        </p:cxnSp>
+        <p:sp>
+          <p:nvSpPr>
+            <p:cNvPr id="152" name="TextBox 151"/>
+            <p:cNvSpPr txBox="1"/>
+            <p:nvPr/>
+          </p:nvSpPr>
+          <p:spPr>
+            <a:xfrm>
+              <a:off x="236347" y="3160681"/>
+              <a:ext cx="3576987" cy="376981"/>
+            </a:xfrm>
+            <a:prstGeom prst="rect">
+              <a:avLst/>
+            </a:prstGeom>
+            <a:noFill/>
+          </p:spPr>
+          <p:txBody>
+            <a:bodyPr wrap="square" rtlCol="0">
+              <a:spAutoFit/>
+            </a:bodyPr>
+            <a:lstStyle/>
+            <a:p>
+              <a:r>
+                <a:rPr lang="en-US" altLang="zh-CN" dirty="0" err="1" smtClean="0"/>
+                <a:t>hasMany</a:t>
+              </a:r>
+              <a:r>
+                <a:rPr lang="zh-CN" altLang="en-US" dirty="0" smtClean="0"/>
+                <a:t> </a:t>
+              </a:r>
+              <a:r>
+                <a:rPr lang="en-US" altLang="zh-CN" dirty="0" smtClean="0"/>
+                <a:t>(subtopics)</a:t>
+              </a:r>
+              <a:endParaRPr lang="en-US" altLang="zh-CN" dirty="0" smtClean="0"/>
+            </a:p>
+            <a:p>
+              <a:r>
+                <a:rPr lang="en-US" altLang="zh-CN" dirty="0" err="1" smtClean="0"/>
+                <a:t>hasMany</a:t>
+              </a:r>
+              <a:r>
+                <a:rPr lang="zh-CN" altLang="en-US" dirty="0" smtClean="0"/>
+                <a:t> </a:t>
+              </a:r>
+              <a:r>
+                <a:rPr lang="en-US" altLang="zh-CN" dirty="0" smtClean="0"/>
+                <a:t>(</a:t>
+              </a:r>
+              <a:r>
+                <a:rPr lang="en-US" altLang="zh-CN" dirty="0" err="1" smtClean="0"/>
+                <a:t>parent_topics</a:t>
+              </a:r>
+              <a:r>
+                <a:rPr lang="en-US" altLang="zh-CN" dirty="0" smtClean="0"/>
+                <a:t>)</a:t>
+              </a:r>
+              <a:endParaRPr lang="en-US" dirty="0"/>
+            </a:p>
+          </p:txBody>
+        </p:sp>
+      </p:grpSp>
     </p:spTree>
     <p:extLst>
       <p:ext uri="{BB962C8B-B14F-4D97-AF65-F5344CB8AC3E}">

</xml_diff>

<commit_message>
notification center partially implementd #9
1. user now can view all the notifications sent to them.
</commit_message>
<xml_diff>
--- a/database_structure.pptx
+++ b/database_structure.pptx
@@ -243,7 +243,7 @@
           <a:p>
             <a:fld id="{4A455F30-BFD7-C44C-A532-EC0FD0695260}" type="datetimeFigureOut">
               <a:rPr lang="en-US" smtClean="0"/>
-              <a:t>6/16/16</a:t>
+              <a:t>6/24/16</a:t>
             </a:fld>
             <a:endParaRPr lang="en-US"/>
           </a:p>
@@ -413,7 +413,7 @@
           <a:p>
             <a:fld id="{4A455F30-BFD7-C44C-A532-EC0FD0695260}" type="datetimeFigureOut">
               <a:rPr lang="en-US" smtClean="0"/>
-              <a:t>6/16/16</a:t>
+              <a:t>6/24/16</a:t>
             </a:fld>
             <a:endParaRPr lang="en-US"/>
           </a:p>
@@ -593,7 +593,7 @@
           <a:p>
             <a:fld id="{4A455F30-BFD7-C44C-A532-EC0FD0695260}" type="datetimeFigureOut">
               <a:rPr lang="en-US" smtClean="0"/>
-              <a:t>6/16/16</a:t>
+              <a:t>6/24/16</a:t>
             </a:fld>
             <a:endParaRPr lang="en-US"/>
           </a:p>
@@ -763,7 +763,7 @@
           <a:p>
             <a:fld id="{4A455F30-BFD7-C44C-A532-EC0FD0695260}" type="datetimeFigureOut">
               <a:rPr lang="en-US" smtClean="0"/>
-              <a:t>6/16/16</a:t>
+              <a:t>6/24/16</a:t>
             </a:fld>
             <a:endParaRPr lang="en-US"/>
           </a:p>
@@ -1009,7 +1009,7 @@
           <a:p>
             <a:fld id="{4A455F30-BFD7-C44C-A532-EC0FD0695260}" type="datetimeFigureOut">
               <a:rPr lang="en-US" smtClean="0"/>
-              <a:t>6/16/16</a:t>
+              <a:t>6/24/16</a:t>
             </a:fld>
             <a:endParaRPr lang="en-US"/>
           </a:p>
@@ -1241,7 +1241,7 @@
           <a:p>
             <a:fld id="{4A455F30-BFD7-C44C-A532-EC0FD0695260}" type="datetimeFigureOut">
               <a:rPr lang="en-US" smtClean="0"/>
-              <a:t>6/16/16</a:t>
+              <a:t>6/24/16</a:t>
             </a:fld>
             <a:endParaRPr lang="en-US"/>
           </a:p>
@@ -1608,7 +1608,7 @@
           <a:p>
             <a:fld id="{4A455F30-BFD7-C44C-A532-EC0FD0695260}" type="datetimeFigureOut">
               <a:rPr lang="en-US" smtClean="0"/>
-              <a:t>6/16/16</a:t>
+              <a:t>6/24/16</a:t>
             </a:fld>
             <a:endParaRPr lang="en-US"/>
           </a:p>
@@ -1726,7 +1726,7 @@
           <a:p>
             <a:fld id="{4A455F30-BFD7-C44C-A532-EC0FD0695260}" type="datetimeFigureOut">
               <a:rPr lang="en-US" smtClean="0"/>
-              <a:t>6/16/16</a:t>
+              <a:t>6/24/16</a:t>
             </a:fld>
             <a:endParaRPr lang="en-US"/>
           </a:p>
@@ -1821,7 +1821,7 @@
           <a:p>
             <a:fld id="{4A455F30-BFD7-C44C-A532-EC0FD0695260}" type="datetimeFigureOut">
               <a:rPr lang="en-US" smtClean="0"/>
-              <a:t>6/16/16</a:t>
+              <a:t>6/24/16</a:t>
             </a:fld>
             <a:endParaRPr lang="en-US"/>
           </a:p>
@@ -2098,7 +2098,7 @@
           <a:p>
             <a:fld id="{4A455F30-BFD7-C44C-A532-EC0FD0695260}" type="datetimeFigureOut">
               <a:rPr lang="en-US" smtClean="0"/>
-              <a:t>6/16/16</a:t>
+              <a:t>6/24/16</a:t>
             </a:fld>
             <a:endParaRPr lang="en-US"/>
           </a:p>
@@ -2351,7 +2351,7 @@
           <a:p>
             <a:fld id="{4A455F30-BFD7-C44C-A532-EC0FD0695260}" type="datetimeFigureOut">
               <a:rPr lang="en-US" smtClean="0"/>
-              <a:t>6/16/16</a:t>
+              <a:t>6/24/16</a:t>
             </a:fld>
             <a:endParaRPr lang="en-US"/>
           </a:p>
@@ -2564,7 +2564,7 @@
           <a:p>
             <a:fld id="{4A455F30-BFD7-C44C-A532-EC0FD0695260}" type="datetimeFigureOut">
               <a:rPr lang="en-US" smtClean="0"/>
-              <a:t>6/16/16</a:t>
+              <a:t>6/24/16</a:t>
             </a:fld>
             <a:endParaRPr lang="en-US"/>
           </a:p>
@@ -3327,11 +3327,7 @@
             <a:p>
               <a:r>
                 <a:rPr lang="en-US" altLang="zh-CN" sz="800" dirty="0" smtClean="0"/>
-                <a:t>Vote</a:t>
-              </a:r>
-              <a:r>
-                <a:rPr lang="en-US" altLang="zh-CN" sz="800" dirty="0" smtClean="0"/>
-                <a:t>:</a:t>
+                <a:t>Vote:</a:t>
               </a:r>
             </a:p>
             <a:p>
@@ -3520,7 +3516,6 @@
                 <a:rPr lang="en-US" altLang="zh-CN" sz="800" dirty="0" smtClean="0"/>
                 <a:t>content</a:t>
               </a:r>
-              <a:endParaRPr lang="en-US" altLang="zh-CN" sz="800" dirty="0" smtClean="0"/>
             </a:p>
             <a:p>
               <a:endParaRPr lang="en-US" altLang="zh-CN" sz="800" dirty="0" smtClean="0"/>
@@ -4017,13 +4012,8 @@
             <a:p>
               <a:r>
                 <a:rPr lang="en-US" altLang="zh-CN" sz="800" dirty="0" smtClean="0"/>
-                <a:t>description</a:t>
-              </a:r>
-              <a:r>
-                <a:rPr lang="en-US" altLang="zh-CN" sz="800" dirty="0" smtClean="0"/>
-                <a:t>:</a:t>
-              </a:r>
-              <a:endParaRPr lang="en-US" altLang="zh-CN" sz="800" dirty="0" smtClean="0"/>
+                <a:t>description:</a:t>
+              </a:r>
             </a:p>
           </p:txBody>
         </p:sp>
@@ -7032,7 +7022,6 @@
                 <a:rPr lang="en-US" altLang="zh-CN" dirty="0" smtClean="0"/>
                 <a:t>)</a:t>
               </a:r>
-              <a:endParaRPr lang="en-US" altLang="zh-CN" dirty="0" smtClean="0"/>
             </a:p>
             <a:p>
               <a:r>
@@ -7148,7 +7137,6 @@
                 <a:rPr lang="en-US" altLang="zh-CN" dirty="0" smtClean="0"/>
                 <a:t>(subtopics)</a:t>
               </a:r>
-              <a:endParaRPr lang="en-US" altLang="zh-CN" dirty="0" smtClean="0"/>
             </a:p>
             <a:p>
               <a:r>
@@ -7377,9 +7365,9 @@
         <p:grpSpPr>
           <a:xfrm>
             <a:off x="920993" y="2201997"/>
-            <a:ext cx="4446049" cy="4447075"/>
+            <a:ext cx="4446049" cy="4724074"/>
             <a:chOff x="616193" y="1897197"/>
-            <a:chExt cx="4446049" cy="4447075"/>
+            <a:chExt cx="4446049" cy="4724074"/>
           </a:xfrm>
         </p:grpSpPr>
         <p:cxnSp>
@@ -7430,7 +7418,7 @@
           <p:spPr>
             <a:xfrm>
               <a:off x="2543972" y="5974940"/>
-              <a:ext cx="1235788" cy="369332"/>
+              <a:ext cx="1054648" cy="646331"/>
             </a:xfrm>
             <a:prstGeom prst="rect">
               <a:avLst/>
@@ -7444,24 +7432,15 @@
             <a:lstStyle/>
             <a:p>
               <a:r>
-                <a:rPr lang="en-US" altLang="zh-CN" dirty="0" smtClean="0"/>
-                <a:t>One</a:t>
-              </a:r>
-              <a:r>
-                <a:rPr lang="zh-CN" altLang="en-US" dirty="0" smtClean="0"/>
-                <a:t> </a:t>
-              </a:r>
-              <a:r>
-                <a:rPr lang="en-US" altLang="zh-CN" dirty="0" smtClean="0"/>
-                <a:t>to</a:t>
-              </a:r>
-              <a:r>
-                <a:rPr lang="zh-CN" altLang="en-US" dirty="0" smtClean="0"/>
-                <a:t> </a:t>
-              </a:r>
-              <a:r>
-                <a:rPr lang="en-US" altLang="zh-CN" dirty="0" smtClean="0"/>
-                <a:t>one</a:t>
+                <a:rPr lang="en-US" altLang="zh-CN" dirty="0" err="1" smtClean="0"/>
+                <a:t>hasMany</a:t>
+              </a:r>
+              <a:endParaRPr lang="en-US" altLang="zh-CN" dirty="0" smtClean="0"/>
+            </a:p>
+            <a:p>
+              <a:r>
+                <a:rPr lang="en-US" altLang="zh-CN" smtClean="0"/>
+                <a:t>BlongsTo</a:t>
               </a:r>
               <a:endParaRPr lang="en-US" dirty="0"/>
             </a:p>

</xml_diff>

<commit_message>
draft feature fully implemented.
</commit_message>
<xml_diff>
--- a/database_structure.pptx
+++ b/database_structure.pptx
@@ -243,7 +243,7 @@
           <a:p>
             <a:fld id="{4A455F30-BFD7-C44C-A532-EC0FD0695260}" type="datetimeFigureOut">
               <a:rPr lang="en-US" smtClean="0"/>
-              <a:t>6/24/16</a:t>
+              <a:t>7/12/16</a:t>
             </a:fld>
             <a:endParaRPr lang="en-US"/>
           </a:p>
@@ -413,7 +413,7 @@
           <a:p>
             <a:fld id="{4A455F30-BFD7-C44C-A532-EC0FD0695260}" type="datetimeFigureOut">
               <a:rPr lang="en-US" smtClean="0"/>
-              <a:t>6/24/16</a:t>
+              <a:t>7/12/16</a:t>
             </a:fld>
             <a:endParaRPr lang="en-US"/>
           </a:p>
@@ -593,7 +593,7 @@
           <a:p>
             <a:fld id="{4A455F30-BFD7-C44C-A532-EC0FD0695260}" type="datetimeFigureOut">
               <a:rPr lang="en-US" smtClean="0"/>
-              <a:t>6/24/16</a:t>
+              <a:t>7/12/16</a:t>
             </a:fld>
             <a:endParaRPr lang="en-US"/>
           </a:p>
@@ -763,7 +763,7 @@
           <a:p>
             <a:fld id="{4A455F30-BFD7-C44C-A532-EC0FD0695260}" type="datetimeFigureOut">
               <a:rPr lang="en-US" smtClean="0"/>
-              <a:t>6/24/16</a:t>
+              <a:t>7/12/16</a:t>
             </a:fld>
             <a:endParaRPr lang="en-US"/>
           </a:p>
@@ -1009,7 +1009,7 @@
           <a:p>
             <a:fld id="{4A455F30-BFD7-C44C-A532-EC0FD0695260}" type="datetimeFigureOut">
               <a:rPr lang="en-US" smtClean="0"/>
-              <a:t>6/24/16</a:t>
+              <a:t>7/12/16</a:t>
             </a:fld>
             <a:endParaRPr lang="en-US"/>
           </a:p>
@@ -1241,7 +1241,7 @@
           <a:p>
             <a:fld id="{4A455F30-BFD7-C44C-A532-EC0FD0695260}" type="datetimeFigureOut">
               <a:rPr lang="en-US" smtClean="0"/>
-              <a:t>6/24/16</a:t>
+              <a:t>7/12/16</a:t>
             </a:fld>
             <a:endParaRPr lang="en-US"/>
           </a:p>
@@ -1608,7 +1608,7 @@
           <a:p>
             <a:fld id="{4A455F30-BFD7-C44C-A532-EC0FD0695260}" type="datetimeFigureOut">
               <a:rPr lang="en-US" smtClean="0"/>
-              <a:t>6/24/16</a:t>
+              <a:t>7/12/16</a:t>
             </a:fld>
             <a:endParaRPr lang="en-US"/>
           </a:p>
@@ -1726,7 +1726,7 @@
           <a:p>
             <a:fld id="{4A455F30-BFD7-C44C-A532-EC0FD0695260}" type="datetimeFigureOut">
               <a:rPr lang="en-US" smtClean="0"/>
-              <a:t>6/24/16</a:t>
+              <a:t>7/12/16</a:t>
             </a:fld>
             <a:endParaRPr lang="en-US"/>
           </a:p>
@@ -1821,7 +1821,7 @@
           <a:p>
             <a:fld id="{4A455F30-BFD7-C44C-A532-EC0FD0695260}" type="datetimeFigureOut">
               <a:rPr lang="en-US" smtClean="0"/>
-              <a:t>6/24/16</a:t>
+              <a:t>7/12/16</a:t>
             </a:fld>
             <a:endParaRPr lang="en-US"/>
           </a:p>
@@ -2098,7 +2098,7 @@
           <a:p>
             <a:fld id="{4A455F30-BFD7-C44C-A532-EC0FD0695260}" type="datetimeFigureOut">
               <a:rPr lang="en-US" smtClean="0"/>
-              <a:t>6/24/16</a:t>
+              <a:t>7/12/16</a:t>
             </a:fld>
             <a:endParaRPr lang="en-US"/>
           </a:p>
@@ -2351,7 +2351,7 @@
           <a:p>
             <a:fld id="{4A455F30-BFD7-C44C-A532-EC0FD0695260}" type="datetimeFigureOut">
               <a:rPr lang="en-US" smtClean="0"/>
-              <a:t>6/24/16</a:t>
+              <a:t>7/12/16</a:t>
             </a:fld>
             <a:endParaRPr lang="en-US"/>
           </a:p>
@@ -2564,7 +2564,7 @@
           <a:p>
             <a:fld id="{4A455F30-BFD7-C44C-A532-EC0FD0695260}" type="datetimeFigureOut">
               <a:rPr lang="en-US" smtClean="0"/>
-              <a:t>6/24/16</a:t>
+              <a:t>7/12/16</a:t>
             </a:fld>
             <a:endParaRPr lang="en-US"/>
           </a:p>
@@ -6541,30 +6541,28 @@
         </p:nvGrpSpPr>
         <p:grpSpPr>
           <a:xfrm>
-            <a:off x="1198699" y="-44305"/>
-            <a:ext cx="3108835" cy="969467"/>
-            <a:chOff x="-2701914" y="2169970"/>
-            <a:chExt cx="3108835" cy="969467"/>
+            <a:off x="1814514" y="1364457"/>
+            <a:ext cx="2495711" cy="1463545"/>
+            <a:chOff x="-2076385" y="1739947"/>
+            <a:chExt cx="2495711" cy="1463545"/>
           </a:xfrm>
         </p:grpSpPr>
         <p:cxnSp>
           <p:nvCxnSpPr>
             <p:cNvPr id="130" name="Curved Connector 129"/>
             <p:cNvCxnSpPr>
-              <a:stCxn id="44" idx="0"/>
-              <a:endCxn id="8" idx="0"/>
+              <a:stCxn id="19" idx="0"/>
+              <a:endCxn id="4" idx="3"/>
             </p:cNvCxnSpPr>
             <p:nvPr/>
           </p:nvCxnSpPr>
           <p:spPr>
             <a:xfrm rot="16200000" flipV="1">
-              <a:off x="-1295752" y="1436763"/>
-              <a:ext cx="296512" cy="3108835"/>
-            </a:xfrm>
-            <a:prstGeom prst="curvedConnector3">
-              <a:avLst>
-                <a:gd name="adj1" fmla="val 177096"/>
-              </a:avLst>
+              <a:off x="-1560302" y="1223864"/>
+              <a:ext cx="1463545" cy="2495711"/>
+            </a:xfrm>
+            <a:prstGeom prst="curvedConnector2">
+              <a:avLst/>
             </a:prstGeom>
             <a:ln>
               <a:headEnd type="triangle"/>
@@ -6648,29 +6646,29 @@
         <p:grpSpPr>
           <a:xfrm>
             <a:off x="582885" y="90341"/>
-            <a:ext cx="3726102" cy="923330"/>
+            <a:ext cx="3728792" cy="2737661"/>
             <a:chOff x="-3470128" y="2152216"/>
-            <a:chExt cx="3726102" cy="923330"/>
+            <a:chExt cx="3728792" cy="2737661"/>
           </a:xfrm>
         </p:grpSpPr>
         <p:cxnSp>
           <p:nvCxnSpPr>
             <p:cNvPr id="136" name="Curved Connector 135"/>
             <p:cNvCxnSpPr>
-              <a:stCxn id="42" idx="0"/>
+              <a:stCxn id="17" idx="0"/>
               <a:endCxn id="8" idx="1"/>
             </p:cNvCxnSpPr>
             <p:nvPr/>
           </p:nvCxnSpPr>
           <p:spPr>
             <a:xfrm rot="16200000" flipV="1">
-              <a:off x="-1678389" y="1052675"/>
-              <a:ext cx="142623" cy="3726102"/>
+              <a:off x="-2628464" y="2002750"/>
+              <a:ext cx="2045463" cy="3728792"/>
             </a:xfrm>
             <a:prstGeom prst="curvedConnector4">
               <a:avLst>
-                <a:gd name="adj1" fmla="val 368182"/>
-                <a:gd name="adj2" fmla="val 106135"/>
+                <a:gd name="adj1" fmla="val 46238"/>
+                <a:gd name="adj2" fmla="val 106131"/>
               </a:avLst>
             </a:prstGeom>
             <a:ln>

</xml_diff>